<commit_message>
Cleaned up the solution
</commit_message>
<xml_diff>
--- a/React-Workshop part1.pptx
+++ b/React-Workshop part1.pptx
@@ -5,10 +5,10 @@
     <p:sldMasterId id="2147483648" r:id="rId31"/>
   </p:sldMasterIdLst>
   <p:notesMasterIdLst>
-    <p:notesMasterId r:id="rId58"/>
+    <p:notesMasterId r:id="rId60"/>
   </p:notesMasterIdLst>
   <p:handoutMasterIdLst>
-    <p:handoutMasterId r:id="rId59"/>
+    <p:handoutMasterId r:id="rId61"/>
   </p:handoutMasterIdLst>
   <p:sldIdLst>
     <p:sldId id="256" r:id="rId32"/>
@@ -29,38 +29,40 @@
     <p:sldId id="278" r:id="rId47"/>
     <p:sldId id="279" r:id="rId48"/>
     <p:sldId id="269" r:id="rId49"/>
-    <p:sldId id="270" r:id="rId50"/>
-    <p:sldId id="280" r:id="rId51"/>
-    <p:sldId id="272" r:id="rId52"/>
-    <p:sldId id="281" r:id="rId53"/>
-    <p:sldId id="273" r:id="rId54"/>
-    <p:sldId id="274" r:id="rId55"/>
-    <p:sldId id="275" r:id="rId56"/>
-    <p:sldId id="282" r:id="rId57"/>
+    <p:sldId id="283" r:id="rId50"/>
+    <p:sldId id="284" r:id="rId51"/>
+    <p:sldId id="270" r:id="rId52"/>
+    <p:sldId id="280" r:id="rId53"/>
+    <p:sldId id="272" r:id="rId54"/>
+    <p:sldId id="281" r:id="rId55"/>
+    <p:sldId id="273" r:id="rId56"/>
+    <p:sldId id="274" r:id="rId57"/>
+    <p:sldId id="275" r:id="rId58"/>
+    <p:sldId id="282" r:id="rId59"/>
   </p:sldIdLst>
   <p:sldSz cx="12192000" cy="6858000"/>
   <p:notesSz cx="6858000" cy="9144000"/>
   <p:embeddedFontLst>
     <p:embeddedFont>
       <p:font typeface="AA Zuehlke" panose="02000503060000020004" pitchFamily="2" charset="0"/>
-      <p:regular r:id="rId60"/>
-      <p:italic r:id="rId61"/>
-    </p:embeddedFont>
-    <p:embeddedFont>
-      <p:font typeface="AA Zuehlke Medium" panose="02000603060000020004" pitchFamily="2" charset="0"/>
       <p:regular r:id="rId62"/>
       <p:italic r:id="rId63"/>
     </p:embeddedFont>
     <p:embeddedFont>
+      <p:font typeface="AA Zuehlke Medium" panose="02000603060000020004" pitchFamily="2" charset="0"/>
+      <p:regular r:id="rId64"/>
+      <p:italic r:id="rId65"/>
+    </p:embeddedFont>
+    <p:embeddedFont>
       <p:font typeface="Consolas" panose="020B0609020204030204" pitchFamily="49" charset="0"/>
-      <p:regular r:id="rId64"/>
-      <p:bold r:id="rId65"/>
-      <p:italic r:id="rId66"/>
-      <p:boldItalic r:id="rId67"/>
+      <p:regular r:id="rId66"/>
+      <p:bold r:id="rId67"/>
+      <p:italic r:id="rId68"/>
+      <p:boldItalic r:id="rId69"/>
     </p:embeddedFont>
   </p:embeddedFontLst>
   <p:custDataLst>
-    <p:tags r:id="rId68"/>
+    <p:tags r:id="rId70"/>
   </p:custDataLst>
   <p:defaultTextStyle>
     <a:defPPr>
@@ -1135,7 +1137,7 @@
             <a:fld id="{04E102C5-3B9C-48EE-BFF0-2E7AF2F2A1F4}" type="slidenum">
               <a:rPr lang="en-GB" noProof="0" smtClean="0"/>
               <a:pPr/>
-              <a:t>19</a:t>
+              <a:t>21</a:t>
             </a:fld>
             <a:endParaRPr lang="en-GB" noProof="0"/>
           </a:p>
@@ -1250,7 +1252,7 @@
             <a:fld id="{04E102C5-3B9C-48EE-BFF0-2E7AF2F2A1F4}" type="slidenum">
               <a:rPr lang="en-GB" noProof="0" smtClean="0"/>
               <a:pPr/>
-              <a:t>20</a:t>
+              <a:t>22</a:t>
             </a:fld>
             <a:endParaRPr lang="en-GB" noProof="0"/>
           </a:p>
@@ -1335,7 +1337,7 @@
             <a:fld id="{04E102C5-3B9C-48EE-BFF0-2E7AF2F2A1F4}" type="slidenum">
               <a:rPr lang="en-GB" noProof="0" smtClean="0"/>
               <a:pPr/>
-              <a:t>21</a:t>
+              <a:t>23</a:t>
             </a:fld>
             <a:endParaRPr lang="en-GB" noProof="0"/>
           </a:p>
@@ -1450,7 +1452,7 @@
             <a:fld id="{04E102C5-3B9C-48EE-BFF0-2E7AF2F2A1F4}" type="slidenum">
               <a:rPr lang="en-GB" noProof="0" smtClean="0"/>
               <a:pPr/>
-              <a:t>22</a:t>
+              <a:t>24</a:t>
             </a:fld>
             <a:endParaRPr lang="en-GB" noProof="0"/>
           </a:p>
@@ -1535,7 +1537,7 @@
             <a:fld id="{04E102C5-3B9C-48EE-BFF0-2E7AF2F2A1F4}" type="slidenum">
               <a:rPr lang="en-GB" noProof="0" smtClean="0"/>
               <a:pPr/>
-              <a:t>23</a:t>
+              <a:t>25</a:t>
             </a:fld>
             <a:endParaRPr lang="en-GB" noProof="0"/>
           </a:p>
@@ -1620,7 +1622,7 @@
             <a:fld id="{04E102C5-3B9C-48EE-BFF0-2E7AF2F2A1F4}" type="slidenum">
               <a:rPr lang="en-GB" noProof="0" smtClean="0"/>
               <a:pPr/>
-              <a:t>24</a:t>
+              <a:t>26</a:t>
             </a:fld>
             <a:endParaRPr lang="en-GB" noProof="0"/>
           </a:p>
@@ -1705,7 +1707,7 @@
             <a:fld id="{04E102C5-3B9C-48EE-BFF0-2E7AF2F2A1F4}" type="slidenum">
               <a:rPr lang="en-GB" noProof="0" smtClean="0"/>
               <a:pPr/>
-              <a:t>25</a:t>
+              <a:t>27</a:t>
             </a:fld>
             <a:endParaRPr lang="en-GB" noProof="0"/>
           </a:p>
@@ -27436,6 +27438,1226 @@
       </p:grpSpPr>
       <p:sp>
         <p:nvSpPr>
+          <p:cNvPr id="2" name="Title 1">
+            <a:extLst>
+              <a:ext uri="{FF2B5EF4-FFF2-40B4-BE49-F238E27FC236}">
+                <a16:creationId xmlns:a16="http://schemas.microsoft.com/office/drawing/2014/main" id="{3D028D5D-E0E4-444E-956E-CA090341D602}"/>
+              </a:ext>
+            </a:extLst>
+          </p:cNvPr>
+          <p:cNvSpPr>
+            <a:spLocks noGrp="1"/>
+          </p:cNvSpPr>
+          <p:nvPr>
+            <p:ph type="title"/>
+          </p:nvPr>
+        </p:nvSpPr>
+        <p:spPr/>
+        <p:txBody>
+          <a:bodyPr/>
+          <a:lstStyle/>
+          <a:p>
+            <a:r>
+              <a:rPr lang="en-US" dirty="0"/>
+              <a:t>Recall</a:t>
+            </a:r>
+            <a:endParaRPr lang="LID4096" dirty="0"/>
+          </a:p>
+        </p:txBody>
+      </p:sp>
+      <p:sp>
+        <p:nvSpPr>
+          <p:cNvPr id="3" name="TextBox 2">
+            <a:extLst>
+              <a:ext uri="{FF2B5EF4-FFF2-40B4-BE49-F238E27FC236}">
+                <a16:creationId xmlns:a16="http://schemas.microsoft.com/office/drawing/2014/main" id="{C13BA1D1-270A-4E71-9F2F-F447381808C6}"/>
+              </a:ext>
+            </a:extLst>
+          </p:cNvPr>
+          <p:cNvSpPr txBox="1"/>
+          <p:nvPr/>
+        </p:nvSpPr>
+        <p:spPr>
+          <a:xfrm>
+            <a:off x="406400" y="1268760"/>
+            <a:ext cx="10298112" cy="4536504"/>
+          </a:xfrm>
+          <a:prstGeom prst="rect">
+            <a:avLst/>
+          </a:prstGeom>
+          <a:noFill/>
+        </p:spPr>
+        <p:txBody>
+          <a:bodyPr wrap="none" lIns="0" tIns="0" rIns="0" bIns="0" rtlCol="0">
+            <a:noAutofit/>
+          </a:bodyPr>
+          <a:lstStyle/>
+          <a:p>
+            <a:pPr algn="l"/>
+            <a:r>
+              <a:rPr lang="en-US" sz="2200" i="1" dirty="0" err="1">
+                <a:latin typeface="AA Zuehlke" pitchFamily="2" charset="0"/>
+              </a:rPr>
+              <a:t>Javascript</a:t>
+            </a:r>
+            <a:r>
+              <a:rPr lang="en-US" sz="2200" i="1" dirty="0">
+                <a:latin typeface="AA Zuehlke" pitchFamily="2" charset="0"/>
+              </a:rPr>
+              <a:t> </a:t>
+            </a:r>
+            <a:r>
+              <a:rPr lang="en-US" sz="2200" b="1" i="1" dirty="0">
+                <a:latin typeface="AA Zuehlke" pitchFamily="2" charset="0"/>
+              </a:rPr>
+              <a:t>map</a:t>
+            </a:r>
+            <a:r>
+              <a:rPr lang="en-US" sz="2200" i="1" dirty="0">
+                <a:latin typeface="AA Zuehlke" pitchFamily="2" charset="0"/>
+              </a:rPr>
+              <a:t> function</a:t>
+            </a:r>
+          </a:p>
+          <a:p>
+            <a:r>
+              <a:rPr lang="en-US" sz="2200" dirty="0">
+                <a:latin typeface="AA Zuehlke" pitchFamily="2" charset="0"/>
+              </a:rPr>
+              <a:t>The </a:t>
+            </a:r>
+            <a:r>
+              <a:rPr lang="en-US" sz="2200" b="1" dirty="0">
+                <a:latin typeface="AA Zuehlke" pitchFamily="2" charset="0"/>
+              </a:rPr>
+              <a:t>map() </a:t>
+            </a:r>
+            <a:r>
+              <a:rPr lang="en-US" sz="2200" dirty="0">
+                <a:latin typeface="AA Zuehlke" pitchFamily="2" charset="0"/>
+              </a:rPr>
+              <a:t>method creates a new array with the results of calling a provided function </a:t>
+            </a:r>
+          </a:p>
+          <a:p>
+            <a:r>
+              <a:rPr lang="en-US" sz="2200" dirty="0">
+                <a:latin typeface="AA Zuehlke" pitchFamily="2" charset="0"/>
+              </a:rPr>
+              <a:t>on every element in the calling array.</a:t>
+            </a:r>
+          </a:p>
+          <a:p>
+            <a:endParaRPr lang="en-US" sz="2200" dirty="0">
+              <a:latin typeface="AA Zuehlke" pitchFamily="2" charset="0"/>
+            </a:endParaRPr>
+          </a:p>
+          <a:p>
+            <a:r>
+              <a:rPr lang="en-US" sz="2000" dirty="0">
+                <a:solidFill>
+                  <a:srgbClr val="569CD6"/>
+                </a:solidFill>
+                <a:latin typeface="Consolas" panose="020B0609020204030204" pitchFamily="49" charset="0"/>
+              </a:rPr>
+              <a:t>const</a:t>
+            </a:r>
+            <a:r>
+              <a:rPr lang="en-US" sz="2000" dirty="0">
+                <a:solidFill>
+                  <a:srgbClr val="D4D4D4"/>
+                </a:solidFill>
+                <a:latin typeface="Consolas" panose="020B0609020204030204" pitchFamily="49" charset="0"/>
+              </a:rPr>
+              <a:t> </a:t>
+            </a:r>
+            <a:r>
+              <a:rPr lang="en-US" sz="2000" dirty="0">
+                <a:solidFill>
+                  <a:srgbClr val="9CDCFE"/>
+                </a:solidFill>
+                <a:latin typeface="Consolas" panose="020B0609020204030204" pitchFamily="49" charset="0"/>
+              </a:rPr>
+              <a:t>array1</a:t>
+            </a:r>
+            <a:r>
+              <a:rPr lang="en-US" sz="2000" dirty="0">
+                <a:solidFill>
+                  <a:srgbClr val="D4D4D4"/>
+                </a:solidFill>
+                <a:latin typeface="Consolas" panose="020B0609020204030204" pitchFamily="49" charset="0"/>
+              </a:rPr>
+              <a:t> = [</a:t>
+            </a:r>
+            <a:r>
+              <a:rPr lang="en-US" sz="2000" dirty="0">
+                <a:solidFill>
+                  <a:srgbClr val="B5CEA8"/>
+                </a:solidFill>
+                <a:latin typeface="Consolas" panose="020B0609020204030204" pitchFamily="49" charset="0"/>
+              </a:rPr>
+              <a:t>1</a:t>
+            </a:r>
+            <a:r>
+              <a:rPr lang="en-US" sz="2000" dirty="0">
+                <a:solidFill>
+                  <a:srgbClr val="D4D4D4"/>
+                </a:solidFill>
+                <a:latin typeface="Consolas" panose="020B0609020204030204" pitchFamily="49" charset="0"/>
+              </a:rPr>
+              <a:t>, </a:t>
+            </a:r>
+            <a:r>
+              <a:rPr lang="en-US" sz="2000" dirty="0">
+                <a:solidFill>
+                  <a:srgbClr val="B5CEA8"/>
+                </a:solidFill>
+                <a:latin typeface="Consolas" panose="020B0609020204030204" pitchFamily="49" charset="0"/>
+              </a:rPr>
+              <a:t>4</a:t>
+            </a:r>
+            <a:r>
+              <a:rPr lang="en-US" sz="2000" dirty="0">
+                <a:solidFill>
+                  <a:srgbClr val="D4D4D4"/>
+                </a:solidFill>
+                <a:latin typeface="Consolas" panose="020B0609020204030204" pitchFamily="49" charset="0"/>
+              </a:rPr>
+              <a:t>, </a:t>
+            </a:r>
+            <a:r>
+              <a:rPr lang="en-US" sz="2000" dirty="0">
+                <a:solidFill>
+                  <a:srgbClr val="B5CEA8"/>
+                </a:solidFill>
+                <a:latin typeface="Consolas" panose="020B0609020204030204" pitchFamily="49" charset="0"/>
+              </a:rPr>
+              <a:t>9</a:t>
+            </a:r>
+            <a:r>
+              <a:rPr lang="en-US" sz="2000" dirty="0">
+                <a:solidFill>
+                  <a:srgbClr val="D4D4D4"/>
+                </a:solidFill>
+                <a:latin typeface="Consolas" panose="020B0609020204030204" pitchFamily="49" charset="0"/>
+              </a:rPr>
+              <a:t>, </a:t>
+            </a:r>
+            <a:r>
+              <a:rPr lang="en-US" sz="2000" dirty="0">
+                <a:solidFill>
+                  <a:srgbClr val="B5CEA8"/>
+                </a:solidFill>
+                <a:latin typeface="Consolas" panose="020B0609020204030204" pitchFamily="49" charset="0"/>
+              </a:rPr>
+              <a:t>16</a:t>
+            </a:r>
+            <a:r>
+              <a:rPr lang="en-US" sz="2000" dirty="0">
+                <a:solidFill>
+                  <a:srgbClr val="D4D4D4"/>
+                </a:solidFill>
+                <a:latin typeface="Consolas" panose="020B0609020204030204" pitchFamily="49" charset="0"/>
+              </a:rPr>
+              <a:t>];</a:t>
+            </a:r>
+          </a:p>
+          <a:p>
+            <a:br>
+              <a:rPr lang="en-US" sz="2000" dirty="0">
+                <a:solidFill>
+                  <a:srgbClr val="D4D4D4"/>
+                </a:solidFill>
+                <a:latin typeface="Consolas" panose="020B0609020204030204" pitchFamily="49" charset="0"/>
+              </a:rPr>
+            </a:br>
+            <a:r>
+              <a:rPr lang="en-US" sz="2000" dirty="0">
+                <a:solidFill>
+                  <a:srgbClr val="6A9955"/>
+                </a:solidFill>
+                <a:latin typeface="Consolas" panose="020B0609020204030204" pitchFamily="49" charset="0"/>
+              </a:rPr>
+              <a:t>// pass a function to map</a:t>
+            </a:r>
+            <a:endParaRPr lang="en-US" sz="2000" dirty="0">
+              <a:solidFill>
+                <a:srgbClr val="D4D4D4"/>
+              </a:solidFill>
+              <a:latin typeface="Consolas" panose="020B0609020204030204" pitchFamily="49" charset="0"/>
+            </a:endParaRPr>
+          </a:p>
+          <a:p>
+            <a:r>
+              <a:rPr lang="en-US" sz="2000" dirty="0">
+                <a:solidFill>
+                  <a:srgbClr val="569CD6"/>
+                </a:solidFill>
+                <a:latin typeface="Consolas" panose="020B0609020204030204" pitchFamily="49" charset="0"/>
+              </a:rPr>
+              <a:t>const</a:t>
+            </a:r>
+            <a:r>
+              <a:rPr lang="en-US" sz="2000" dirty="0">
+                <a:solidFill>
+                  <a:srgbClr val="D4D4D4"/>
+                </a:solidFill>
+                <a:latin typeface="Consolas" panose="020B0609020204030204" pitchFamily="49" charset="0"/>
+              </a:rPr>
+              <a:t> </a:t>
+            </a:r>
+            <a:r>
+              <a:rPr lang="en-US" sz="2000" dirty="0">
+                <a:solidFill>
+                  <a:srgbClr val="9CDCFE"/>
+                </a:solidFill>
+                <a:latin typeface="Consolas" panose="020B0609020204030204" pitchFamily="49" charset="0"/>
+              </a:rPr>
+              <a:t>map1</a:t>
+            </a:r>
+            <a:r>
+              <a:rPr lang="en-US" sz="2000" dirty="0">
+                <a:solidFill>
+                  <a:srgbClr val="D4D4D4"/>
+                </a:solidFill>
+                <a:latin typeface="Consolas" panose="020B0609020204030204" pitchFamily="49" charset="0"/>
+              </a:rPr>
+              <a:t> = </a:t>
+            </a:r>
+            <a:r>
+              <a:rPr lang="en-US" sz="2000" dirty="0">
+                <a:solidFill>
+                  <a:srgbClr val="9CDCFE"/>
+                </a:solidFill>
+                <a:latin typeface="Consolas" panose="020B0609020204030204" pitchFamily="49" charset="0"/>
+              </a:rPr>
+              <a:t>array1</a:t>
+            </a:r>
+            <a:r>
+              <a:rPr lang="en-US" sz="2000" dirty="0">
+                <a:solidFill>
+                  <a:srgbClr val="D4D4D4"/>
+                </a:solidFill>
+                <a:latin typeface="Consolas" panose="020B0609020204030204" pitchFamily="49" charset="0"/>
+              </a:rPr>
+              <a:t>.</a:t>
+            </a:r>
+            <a:r>
+              <a:rPr lang="en-US" sz="2000" dirty="0">
+                <a:solidFill>
+                  <a:srgbClr val="DCDCAA"/>
+                </a:solidFill>
+                <a:latin typeface="Consolas" panose="020B0609020204030204" pitchFamily="49" charset="0"/>
+              </a:rPr>
+              <a:t>map</a:t>
+            </a:r>
+            <a:r>
+              <a:rPr lang="en-US" sz="2000" dirty="0">
+                <a:solidFill>
+                  <a:srgbClr val="D4D4D4"/>
+                </a:solidFill>
+                <a:latin typeface="Consolas" panose="020B0609020204030204" pitchFamily="49" charset="0"/>
+              </a:rPr>
+              <a:t>(</a:t>
+            </a:r>
+            <a:r>
+              <a:rPr lang="en-US" sz="2000" dirty="0">
+                <a:solidFill>
+                  <a:srgbClr val="9CDCFE"/>
+                </a:solidFill>
+                <a:latin typeface="Consolas" panose="020B0609020204030204" pitchFamily="49" charset="0"/>
+              </a:rPr>
+              <a:t>x</a:t>
+            </a:r>
+            <a:r>
+              <a:rPr lang="en-US" sz="2000" dirty="0">
+                <a:solidFill>
+                  <a:srgbClr val="D4D4D4"/>
+                </a:solidFill>
+                <a:latin typeface="Consolas" panose="020B0609020204030204" pitchFamily="49" charset="0"/>
+              </a:rPr>
+              <a:t> </a:t>
+            </a:r>
+            <a:r>
+              <a:rPr lang="en-US" sz="2000" dirty="0">
+                <a:solidFill>
+                  <a:srgbClr val="569CD6"/>
+                </a:solidFill>
+                <a:latin typeface="Consolas" panose="020B0609020204030204" pitchFamily="49" charset="0"/>
+              </a:rPr>
+              <a:t>=&gt;</a:t>
+            </a:r>
+            <a:r>
+              <a:rPr lang="en-US" sz="2000" dirty="0">
+                <a:solidFill>
+                  <a:srgbClr val="D4D4D4"/>
+                </a:solidFill>
+                <a:latin typeface="Consolas" panose="020B0609020204030204" pitchFamily="49" charset="0"/>
+              </a:rPr>
+              <a:t> </a:t>
+            </a:r>
+            <a:r>
+              <a:rPr lang="en-US" sz="2000" dirty="0">
+                <a:solidFill>
+                  <a:srgbClr val="9CDCFE"/>
+                </a:solidFill>
+                <a:latin typeface="Consolas" panose="020B0609020204030204" pitchFamily="49" charset="0"/>
+              </a:rPr>
+              <a:t>x</a:t>
+            </a:r>
+            <a:r>
+              <a:rPr lang="en-US" sz="2000" dirty="0">
+                <a:solidFill>
+                  <a:srgbClr val="D4D4D4"/>
+                </a:solidFill>
+                <a:latin typeface="Consolas" panose="020B0609020204030204" pitchFamily="49" charset="0"/>
+              </a:rPr>
+              <a:t> * </a:t>
+            </a:r>
+            <a:r>
+              <a:rPr lang="en-US" sz="2000" dirty="0">
+                <a:solidFill>
+                  <a:srgbClr val="B5CEA8"/>
+                </a:solidFill>
+                <a:latin typeface="Consolas" panose="020B0609020204030204" pitchFamily="49" charset="0"/>
+              </a:rPr>
+              <a:t>2</a:t>
+            </a:r>
+            <a:r>
+              <a:rPr lang="en-US" sz="2000" dirty="0">
+                <a:solidFill>
+                  <a:srgbClr val="D4D4D4"/>
+                </a:solidFill>
+                <a:latin typeface="Consolas" panose="020B0609020204030204" pitchFamily="49" charset="0"/>
+              </a:rPr>
+              <a:t>);</a:t>
+            </a:r>
+          </a:p>
+          <a:p>
+            <a:br>
+              <a:rPr lang="en-US" sz="2000" dirty="0">
+                <a:solidFill>
+                  <a:srgbClr val="D4D4D4"/>
+                </a:solidFill>
+                <a:latin typeface="Consolas" panose="020B0609020204030204" pitchFamily="49" charset="0"/>
+              </a:rPr>
+            </a:br>
+            <a:r>
+              <a:rPr lang="en-US" sz="2000" dirty="0">
+                <a:solidFill>
+                  <a:srgbClr val="4EC9B0"/>
+                </a:solidFill>
+                <a:latin typeface="Consolas" panose="020B0609020204030204" pitchFamily="49" charset="0"/>
+              </a:rPr>
+              <a:t>console</a:t>
+            </a:r>
+            <a:r>
+              <a:rPr lang="en-US" sz="2000" dirty="0">
+                <a:solidFill>
+                  <a:srgbClr val="D4D4D4"/>
+                </a:solidFill>
+                <a:latin typeface="Consolas" panose="020B0609020204030204" pitchFamily="49" charset="0"/>
+              </a:rPr>
+              <a:t>.</a:t>
+            </a:r>
+            <a:r>
+              <a:rPr lang="en-US" sz="2000" dirty="0">
+                <a:solidFill>
+                  <a:srgbClr val="DCDCAA"/>
+                </a:solidFill>
+                <a:latin typeface="Consolas" panose="020B0609020204030204" pitchFamily="49" charset="0"/>
+              </a:rPr>
+              <a:t>log</a:t>
+            </a:r>
+            <a:r>
+              <a:rPr lang="en-US" sz="2000" dirty="0">
+                <a:solidFill>
+                  <a:srgbClr val="D4D4D4"/>
+                </a:solidFill>
+                <a:latin typeface="Consolas" panose="020B0609020204030204" pitchFamily="49" charset="0"/>
+              </a:rPr>
+              <a:t>(</a:t>
+            </a:r>
+            <a:r>
+              <a:rPr lang="en-US" sz="2000" dirty="0">
+                <a:solidFill>
+                  <a:srgbClr val="9CDCFE"/>
+                </a:solidFill>
+                <a:latin typeface="Consolas" panose="020B0609020204030204" pitchFamily="49" charset="0"/>
+              </a:rPr>
+              <a:t>map1</a:t>
+            </a:r>
+            <a:r>
+              <a:rPr lang="en-US" sz="2000" dirty="0">
+                <a:solidFill>
+                  <a:srgbClr val="D4D4D4"/>
+                </a:solidFill>
+                <a:latin typeface="Consolas" panose="020B0609020204030204" pitchFamily="49" charset="0"/>
+              </a:rPr>
+              <a:t>);</a:t>
+            </a:r>
+          </a:p>
+          <a:p>
+            <a:r>
+              <a:rPr lang="en-US" sz="2000" dirty="0">
+                <a:solidFill>
+                  <a:srgbClr val="6A9955"/>
+                </a:solidFill>
+                <a:latin typeface="Consolas" panose="020B0609020204030204" pitchFamily="49" charset="0"/>
+              </a:rPr>
+              <a:t>// expected output: Array [2, 8, 18, 32]</a:t>
+            </a:r>
+            <a:endParaRPr lang="en-US" sz="2000" dirty="0">
+              <a:solidFill>
+                <a:srgbClr val="D4D4D4"/>
+              </a:solidFill>
+              <a:latin typeface="Consolas" panose="020B0609020204030204" pitchFamily="49" charset="0"/>
+            </a:endParaRPr>
+          </a:p>
+        </p:txBody>
+      </p:sp>
+    </p:spTree>
+    <p:extLst>
+      <p:ext uri="{BB962C8B-B14F-4D97-AF65-F5344CB8AC3E}">
+        <p14:creationId xmlns:p14="http://schemas.microsoft.com/office/powerpoint/2010/main" val="3207556097"/>
+      </p:ext>
+    </p:extLst>
+  </p:cSld>
+  <p:clrMapOvr>
+    <a:masterClrMapping/>
+  </p:clrMapOvr>
+</p:sld>
+</file>
+
+<file path=ppt/slides/slide2.xml><?xml version="1.0" encoding="utf-8"?>
+<p:sld xmlns:a="http://schemas.openxmlformats.org/drawingml/2006/main" xmlns:r="http://schemas.openxmlformats.org/officeDocument/2006/relationships" xmlns:p="http://schemas.openxmlformats.org/presentationml/2006/main">
+  <p:cSld>
+    <p:spTree>
+      <p:nvGrpSpPr>
+        <p:cNvPr id="1" name=""/>
+        <p:cNvGrpSpPr/>
+        <p:nvPr/>
+      </p:nvGrpSpPr>
+      <p:grpSpPr>
+        <a:xfrm>
+          <a:off x="0" y="0"/>
+          <a:ext cx="0" cy="0"/>
+          <a:chOff x="0" y="0"/>
+          <a:chExt cx="0" cy="0"/>
+        </a:xfrm>
+      </p:grpSpPr>
+      <p:sp>
+        <p:nvSpPr>
+          <p:cNvPr id="7" name="Title 6">
+            <a:extLst>
+              <a:ext uri="{FF2B5EF4-FFF2-40B4-BE49-F238E27FC236}">
+                <a16:creationId xmlns:a16="http://schemas.microsoft.com/office/drawing/2014/main" id="{C778A389-7C32-4030-AF2B-95D055A208C2}"/>
+              </a:ext>
+            </a:extLst>
+          </p:cNvPr>
+          <p:cNvSpPr>
+            <a:spLocks noGrp="1"/>
+          </p:cNvSpPr>
+          <p:nvPr>
+            <p:ph type="title"/>
+          </p:nvPr>
+        </p:nvSpPr>
+        <p:spPr/>
+        <p:txBody>
+          <a:bodyPr/>
+          <a:lstStyle/>
+          <a:p>
+            <a:r>
+              <a:rPr lang="sr-Latn-RS" dirty="0"/>
+              <a:t>React Workshop</a:t>
+            </a:r>
+            <a:endParaRPr lang="LID4096" dirty="0"/>
+          </a:p>
+        </p:txBody>
+      </p:sp>
+      <p:sp>
+        <p:nvSpPr>
+          <p:cNvPr id="8" name="Text Placeholder 7">
+            <a:extLst>
+              <a:ext uri="{FF2B5EF4-FFF2-40B4-BE49-F238E27FC236}">
+                <a16:creationId xmlns:a16="http://schemas.microsoft.com/office/drawing/2014/main" id="{8128D10F-CCF5-40E5-86E1-237E38584E93}"/>
+              </a:ext>
+            </a:extLst>
+          </p:cNvPr>
+          <p:cNvSpPr>
+            <a:spLocks noGrp="1"/>
+          </p:cNvSpPr>
+          <p:nvPr>
+            <p:ph type="body" sz="quarter" idx="13"/>
+          </p:nvPr>
+        </p:nvSpPr>
+        <p:spPr/>
+        <p:txBody>
+          <a:bodyPr/>
+          <a:lstStyle/>
+          <a:p>
+            <a:r>
+              <a:rPr lang="sr-Latn-RS" dirty="0"/>
+              <a:t>What is the plan?</a:t>
+            </a:r>
+          </a:p>
+        </p:txBody>
+      </p:sp>
+      <p:sp>
+        <p:nvSpPr>
+          <p:cNvPr id="12" name="TextBox 11">
+            <a:extLst>
+              <a:ext uri="{FF2B5EF4-FFF2-40B4-BE49-F238E27FC236}">
+                <a16:creationId xmlns:a16="http://schemas.microsoft.com/office/drawing/2014/main" id="{A11EC94D-1A03-4E9A-803E-E4DB376BDA62}"/>
+              </a:ext>
+            </a:extLst>
+          </p:cNvPr>
+          <p:cNvSpPr txBox="1"/>
+          <p:nvPr/>
+        </p:nvSpPr>
+        <p:spPr>
+          <a:xfrm>
+            <a:off x="406400" y="1988840"/>
+            <a:ext cx="9721080" cy="3742360"/>
+          </a:xfrm>
+          <a:prstGeom prst="rect">
+            <a:avLst/>
+          </a:prstGeom>
+          <a:noFill/>
+        </p:spPr>
+        <p:txBody>
+          <a:bodyPr wrap="none" lIns="0" tIns="0" rIns="0" bIns="0" rtlCol="0">
+            <a:noAutofit/>
+          </a:bodyPr>
+          <a:lstStyle/>
+          <a:p>
+            <a:pPr algn="l"/>
+            <a:r>
+              <a:rPr lang="sr-Latn-RS" sz="2200" dirty="0">
+                <a:latin typeface="AA Zuehlke" pitchFamily="2" charset="0"/>
+              </a:rPr>
+              <a:t>Workshop is organized in two parts.</a:t>
+            </a:r>
+          </a:p>
+          <a:p>
+            <a:pPr algn="l"/>
+            <a:r>
+              <a:rPr lang="sr-Latn-RS" sz="2200" dirty="0">
+                <a:latin typeface="AA Zuehlke" pitchFamily="2" charset="0"/>
+              </a:rPr>
+              <a:t>1st Part – Milan Tončić</a:t>
+            </a:r>
+          </a:p>
+          <a:p>
+            <a:pPr algn="l"/>
+            <a:r>
+              <a:rPr lang="sr-Latn-RS" sz="2200" dirty="0">
+                <a:latin typeface="AA Zuehlke" pitchFamily="2" charset="0"/>
+              </a:rPr>
+              <a:t>2nd Part – Milenko Laptošević</a:t>
+            </a:r>
+          </a:p>
+          <a:p>
+            <a:pPr algn="l"/>
+            <a:endParaRPr lang="sr-Latn-RS" sz="2200" dirty="0">
+              <a:latin typeface="AA Zuehlke" pitchFamily="2" charset="0"/>
+            </a:endParaRPr>
+          </a:p>
+          <a:p>
+            <a:pPr marL="342900" indent="-342900" algn="l">
+              <a:buFontTx/>
+              <a:buChar char="-"/>
+            </a:pPr>
+            <a:r>
+              <a:rPr lang="sr-Latn-RS" sz="2200" dirty="0">
+                <a:latin typeface="AA Zuehlke" pitchFamily="2" charset="0"/>
+              </a:rPr>
+              <a:t>Focus is rather on concepts around React not on the css, javascript </a:t>
+            </a:r>
+          </a:p>
+          <a:p>
+            <a:pPr marL="342900" indent="-342900" algn="l">
+              <a:buFontTx/>
+              <a:buChar char="-"/>
+            </a:pPr>
+            <a:r>
+              <a:rPr lang="sr-Latn-RS" sz="2200" dirty="0">
+                <a:latin typeface="AA Zuehlke" pitchFamily="2" charset="0"/>
+              </a:rPr>
+              <a:t>Learning by doing</a:t>
+            </a:r>
+          </a:p>
+        </p:txBody>
+      </p:sp>
+    </p:spTree>
+    <p:extLst>
+      <p:ext uri="{BB962C8B-B14F-4D97-AF65-F5344CB8AC3E}">
+        <p14:creationId xmlns:p14="http://schemas.microsoft.com/office/powerpoint/2010/main" val="2782898408"/>
+      </p:ext>
+    </p:extLst>
+  </p:cSld>
+  <p:clrMapOvr>
+    <a:masterClrMapping/>
+  </p:clrMapOvr>
+</p:sld>
+</file>
+
+<file path=ppt/slides/slide20.xml><?xml version="1.0" encoding="utf-8"?>
+<p:sld xmlns:a="http://schemas.openxmlformats.org/drawingml/2006/main" xmlns:r="http://schemas.openxmlformats.org/officeDocument/2006/relationships" xmlns:p="http://schemas.openxmlformats.org/presentationml/2006/main">
+  <p:cSld>
+    <p:spTree>
+      <p:nvGrpSpPr>
+        <p:cNvPr id="1" name=""/>
+        <p:cNvGrpSpPr/>
+        <p:nvPr/>
+      </p:nvGrpSpPr>
+      <p:grpSpPr>
+        <a:xfrm>
+          <a:off x="0" y="0"/>
+          <a:ext cx="0" cy="0"/>
+          <a:chOff x="0" y="0"/>
+          <a:chExt cx="0" cy="0"/>
+        </a:xfrm>
+      </p:grpSpPr>
+      <p:sp>
+        <p:nvSpPr>
+          <p:cNvPr id="3" name="Title 1">
+            <a:extLst>
+              <a:ext uri="{FF2B5EF4-FFF2-40B4-BE49-F238E27FC236}">
+                <a16:creationId xmlns:a16="http://schemas.microsoft.com/office/drawing/2014/main" id="{BC1C9522-58D0-4785-87FC-189531E68E20}"/>
+              </a:ext>
+            </a:extLst>
+          </p:cNvPr>
+          <p:cNvSpPr>
+            <a:spLocks noGrp="1"/>
+          </p:cNvSpPr>
+          <p:nvPr>
+            <p:ph type="title"/>
+          </p:nvPr>
+        </p:nvSpPr>
+        <p:spPr>
+          <a:xfrm>
+            <a:off x="406400" y="406400"/>
+            <a:ext cx="11379200" cy="670063"/>
+          </a:xfrm>
+        </p:spPr>
+        <p:txBody>
+          <a:bodyPr/>
+          <a:lstStyle/>
+          <a:p>
+            <a:r>
+              <a:rPr lang="en-US" dirty="0"/>
+              <a:t>Recall</a:t>
+            </a:r>
+            <a:endParaRPr lang="LID4096" dirty="0"/>
+          </a:p>
+        </p:txBody>
+      </p:sp>
+      <p:sp>
+        <p:nvSpPr>
+          <p:cNvPr id="4" name="TextBox 3">
+            <a:extLst>
+              <a:ext uri="{FF2B5EF4-FFF2-40B4-BE49-F238E27FC236}">
+                <a16:creationId xmlns:a16="http://schemas.microsoft.com/office/drawing/2014/main" id="{59971F49-9613-432B-80CF-E834D612A3EC}"/>
+              </a:ext>
+            </a:extLst>
+          </p:cNvPr>
+          <p:cNvSpPr txBox="1"/>
+          <p:nvPr/>
+        </p:nvSpPr>
+        <p:spPr>
+          <a:xfrm>
+            <a:off x="406400" y="1268760"/>
+            <a:ext cx="10968005" cy="3816424"/>
+          </a:xfrm>
+          <a:prstGeom prst="rect">
+            <a:avLst/>
+          </a:prstGeom>
+          <a:noFill/>
+        </p:spPr>
+        <p:txBody>
+          <a:bodyPr wrap="none" lIns="0" tIns="0" rIns="0" bIns="0" rtlCol="0">
+            <a:noAutofit/>
+          </a:bodyPr>
+          <a:lstStyle/>
+          <a:p>
+            <a:r>
+              <a:rPr lang="en-US" sz="2200" i="1" dirty="0" err="1">
+                <a:latin typeface="AA Zuehlke" pitchFamily="2" charset="0"/>
+              </a:rPr>
+              <a:t>Javascript</a:t>
+            </a:r>
+            <a:r>
+              <a:rPr lang="en-US" sz="2200" i="1" dirty="0">
+                <a:latin typeface="AA Zuehlke" pitchFamily="2" charset="0"/>
+              </a:rPr>
+              <a:t> </a:t>
+            </a:r>
+            <a:r>
+              <a:rPr lang="en-US" sz="2200" b="1" dirty="0">
+                <a:latin typeface="AA Zuehlke" pitchFamily="2" charset="0"/>
+              </a:rPr>
+              <a:t>filter</a:t>
+            </a:r>
+            <a:r>
+              <a:rPr lang="en-US" sz="2200" i="1" dirty="0">
+                <a:latin typeface="AA Zuehlke" pitchFamily="2" charset="0"/>
+              </a:rPr>
+              <a:t> function</a:t>
+            </a:r>
+            <a:endParaRPr lang="en-US" sz="2200" dirty="0">
+              <a:latin typeface="AA Zuehlke" pitchFamily="2" charset="0"/>
+            </a:endParaRPr>
+          </a:p>
+          <a:p>
+            <a:r>
+              <a:rPr lang="en-US" sz="2200" dirty="0">
+                <a:latin typeface="AA Zuehlke" pitchFamily="2" charset="0"/>
+              </a:rPr>
+              <a:t>The </a:t>
+            </a:r>
+            <a:r>
+              <a:rPr lang="en-US" sz="2200" b="1" dirty="0">
+                <a:latin typeface="AA Zuehlke" pitchFamily="2" charset="0"/>
+              </a:rPr>
+              <a:t>filter()</a:t>
+            </a:r>
+            <a:r>
+              <a:rPr lang="en-US" sz="2200" dirty="0">
+                <a:latin typeface="AA Zuehlke" pitchFamily="2" charset="0"/>
+              </a:rPr>
+              <a:t> method creates a new array with all elements that pass the test </a:t>
+            </a:r>
+          </a:p>
+          <a:p>
+            <a:r>
+              <a:rPr lang="en-US" sz="2200" dirty="0">
+                <a:latin typeface="AA Zuehlke" pitchFamily="2" charset="0"/>
+              </a:rPr>
+              <a:t>implemented by the provided function.</a:t>
+            </a:r>
+          </a:p>
+          <a:p>
+            <a:endParaRPr lang="en-US" sz="2200" dirty="0">
+              <a:latin typeface="AA Zuehlke" pitchFamily="2" charset="0"/>
+            </a:endParaRPr>
+          </a:p>
+          <a:p>
+            <a:r>
+              <a:rPr lang="en-US" sz="2000" dirty="0">
+                <a:solidFill>
+                  <a:srgbClr val="569CD6"/>
+                </a:solidFill>
+                <a:latin typeface="Consolas" panose="020B0609020204030204" pitchFamily="49" charset="0"/>
+              </a:rPr>
+              <a:t>const</a:t>
+            </a:r>
+            <a:r>
+              <a:rPr lang="en-US" sz="2000" dirty="0">
+                <a:solidFill>
+                  <a:srgbClr val="D4D4D4"/>
+                </a:solidFill>
+                <a:latin typeface="Consolas" panose="020B0609020204030204" pitchFamily="49" charset="0"/>
+              </a:rPr>
+              <a:t> </a:t>
+            </a:r>
+            <a:r>
+              <a:rPr lang="en-US" sz="2000" dirty="0">
+                <a:solidFill>
+                  <a:srgbClr val="9CDCFE"/>
+                </a:solidFill>
+                <a:latin typeface="Consolas" panose="020B0609020204030204" pitchFamily="49" charset="0"/>
+              </a:rPr>
+              <a:t>words</a:t>
+            </a:r>
+            <a:r>
+              <a:rPr lang="en-US" sz="2000" dirty="0">
+                <a:solidFill>
+                  <a:srgbClr val="D4D4D4"/>
+                </a:solidFill>
+                <a:latin typeface="Consolas" panose="020B0609020204030204" pitchFamily="49" charset="0"/>
+              </a:rPr>
+              <a:t> = [</a:t>
+            </a:r>
+            <a:r>
+              <a:rPr lang="en-US" sz="2000" dirty="0">
+                <a:solidFill>
+                  <a:srgbClr val="CE9178"/>
+                </a:solidFill>
+                <a:latin typeface="Consolas" panose="020B0609020204030204" pitchFamily="49" charset="0"/>
+              </a:rPr>
+              <a:t>'spray'</a:t>
+            </a:r>
+            <a:r>
+              <a:rPr lang="en-US" sz="2000" dirty="0">
+                <a:solidFill>
+                  <a:srgbClr val="D4D4D4"/>
+                </a:solidFill>
+                <a:latin typeface="Consolas" panose="020B0609020204030204" pitchFamily="49" charset="0"/>
+              </a:rPr>
+              <a:t>, </a:t>
+            </a:r>
+            <a:r>
+              <a:rPr lang="en-US" sz="2000" dirty="0">
+                <a:solidFill>
+                  <a:srgbClr val="CE9178"/>
+                </a:solidFill>
+                <a:latin typeface="Consolas" panose="020B0609020204030204" pitchFamily="49" charset="0"/>
+              </a:rPr>
+              <a:t>'limit'</a:t>
+            </a:r>
+            <a:r>
+              <a:rPr lang="en-US" sz="2000" dirty="0">
+                <a:solidFill>
+                  <a:srgbClr val="D4D4D4"/>
+                </a:solidFill>
+                <a:latin typeface="Consolas" panose="020B0609020204030204" pitchFamily="49" charset="0"/>
+              </a:rPr>
+              <a:t>, </a:t>
+            </a:r>
+            <a:r>
+              <a:rPr lang="en-US" sz="2000" dirty="0">
+                <a:solidFill>
+                  <a:srgbClr val="CE9178"/>
+                </a:solidFill>
+                <a:latin typeface="Consolas" panose="020B0609020204030204" pitchFamily="49" charset="0"/>
+              </a:rPr>
+              <a:t>'elite'</a:t>
+            </a:r>
+            <a:r>
+              <a:rPr lang="en-US" sz="2000" dirty="0">
+                <a:solidFill>
+                  <a:srgbClr val="D4D4D4"/>
+                </a:solidFill>
+                <a:latin typeface="Consolas" panose="020B0609020204030204" pitchFamily="49" charset="0"/>
+              </a:rPr>
+              <a:t>, </a:t>
+            </a:r>
+            <a:r>
+              <a:rPr lang="en-US" sz="2000" dirty="0">
+                <a:solidFill>
+                  <a:srgbClr val="CE9178"/>
+                </a:solidFill>
+                <a:latin typeface="Consolas" panose="020B0609020204030204" pitchFamily="49" charset="0"/>
+              </a:rPr>
+              <a:t>'exuberant'</a:t>
+            </a:r>
+            <a:r>
+              <a:rPr lang="en-US" sz="2000" dirty="0">
+                <a:solidFill>
+                  <a:srgbClr val="D4D4D4"/>
+                </a:solidFill>
+                <a:latin typeface="Consolas" panose="020B0609020204030204" pitchFamily="49" charset="0"/>
+              </a:rPr>
+              <a:t>, </a:t>
+            </a:r>
+            <a:r>
+              <a:rPr lang="en-US" sz="2000" dirty="0">
+                <a:solidFill>
+                  <a:srgbClr val="CE9178"/>
+                </a:solidFill>
+                <a:latin typeface="Consolas" panose="020B0609020204030204" pitchFamily="49" charset="0"/>
+              </a:rPr>
+              <a:t>'destruction'</a:t>
+            </a:r>
+            <a:r>
+              <a:rPr lang="en-US" sz="2000" dirty="0">
+                <a:solidFill>
+                  <a:srgbClr val="D4D4D4"/>
+                </a:solidFill>
+                <a:latin typeface="Consolas" panose="020B0609020204030204" pitchFamily="49" charset="0"/>
+              </a:rPr>
+              <a:t>, </a:t>
+            </a:r>
+            <a:r>
+              <a:rPr lang="en-US" sz="2000" dirty="0">
+                <a:solidFill>
+                  <a:srgbClr val="CE9178"/>
+                </a:solidFill>
+                <a:latin typeface="Consolas" panose="020B0609020204030204" pitchFamily="49" charset="0"/>
+              </a:rPr>
+              <a:t>'present'</a:t>
+            </a:r>
+            <a:r>
+              <a:rPr lang="en-US" sz="2000" dirty="0">
+                <a:solidFill>
+                  <a:srgbClr val="D4D4D4"/>
+                </a:solidFill>
+                <a:latin typeface="Consolas" panose="020B0609020204030204" pitchFamily="49" charset="0"/>
+              </a:rPr>
+              <a:t>];</a:t>
+            </a:r>
+          </a:p>
+          <a:p>
+            <a:br>
+              <a:rPr lang="en-US" sz="2000" dirty="0">
+                <a:solidFill>
+                  <a:srgbClr val="D4D4D4"/>
+                </a:solidFill>
+                <a:latin typeface="Consolas" panose="020B0609020204030204" pitchFamily="49" charset="0"/>
+              </a:rPr>
+            </a:br>
+            <a:r>
+              <a:rPr lang="en-US" sz="2000" dirty="0">
+                <a:solidFill>
+                  <a:srgbClr val="569CD6"/>
+                </a:solidFill>
+                <a:latin typeface="Consolas" panose="020B0609020204030204" pitchFamily="49" charset="0"/>
+              </a:rPr>
+              <a:t>const</a:t>
+            </a:r>
+            <a:r>
+              <a:rPr lang="en-US" sz="2000" dirty="0">
+                <a:solidFill>
+                  <a:srgbClr val="D4D4D4"/>
+                </a:solidFill>
+                <a:latin typeface="Consolas" panose="020B0609020204030204" pitchFamily="49" charset="0"/>
+              </a:rPr>
+              <a:t> </a:t>
+            </a:r>
+            <a:r>
+              <a:rPr lang="en-US" sz="2000" dirty="0">
+                <a:solidFill>
+                  <a:srgbClr val="9CDCFE"/>
+                </a:solidFill>
+                <a:latin typeface="Consolas" panose="020B0609020204030204" pitchFamily="49" charset="0"/>
+              </a:rPr>
+              <a:t>result</a:t>
+            </a:r>
+            <a:r>
+              <a:rPr lang="en-US" sz="2000" dirty="0">
+                <a:solidFill>
+                  <a:srgbClr val="D4D4D4"/>
+                </a:solidFill>
+                <a:latin typeface="Consolas" panose="020B0609020204030204" pitchFamily="49" charset="0"/>
+              </a:rPr>
+              <a:t> = </a:t>
+            </a:r>
+            <a:r>
+              <a:rPr lang="en-US" sz="2000" dirty="0" err="1">
+                <a:solidFill>
+                  <a:srgbClr val="9CDCFE"/>
+                </a:solidFill>
+                <a:latin typeface="Consolas" panose="020B0609020204030204" pitchFamily="49" charset="0"/>
+              </a:rPr>
+              <a:t>words</a:t>
+            </a:r>
+            <a:r>
+              <a:rPr lang="en-US" sz="2000" dirty="0" err="1">
+                <a:solidFill>
+                  <a:srgbClr val="D4D4D4"/>
+                </a:solidFill>
+                <a:latin typeface="Consolas" panose="020B0609020204030204" pitchFamily="49" charset="0"/>
+              </a:rPr>
+              <a:t>.</a:t>
+            </a:r>
+            <a:r>
+              <a:rPr lang="en-US" sz="2000" dirty="0" err="1">
+                <a:solidFill>
+                  <a:srgbClr val="DCDCAA"/>
+                </a:solidFill>
+                <a:latin typeface="Consolas" panose="020B0609020204030204" pitchFamily="49" charset="0"/>
+              </a:rPr>
+              <a:t>filter</a:t>
+            </a:r>
+            <a:r>
+              <a:rPr lang="en-US" sz="2000" dirty="0">
+                <a:solidFill>
+                  <a:srgbClr val="D4D4D4"/>
+                </a:solidFill>
+                <a:latin typeface="Consolas" panose="020B0609020204030204" pitchFamily="49" charset="0"/>
+              </a:rPr>
+              <a:t>(</a:t>
+            </a:r>
+            <a:r>
+              <a:rPr lang="en-US" sz="2000" dirty="0">
+                <a:solidFill>
+                  <a:srgbClr val="9CDCFE"/>
+                </a:solidFill>
+                <a:latin typeface="Consolas" panose="020B0609020204030204" pitchFamily="49" charset="0"/>
+              </a:rPr>
+              <a:t>word</a:t>
+            </a:r>
+            <a:r>
+              <a:rPr lang="en-US" sz="2000" dirty="0">
+                <a:solidFill>
+                  <a:srgbClr val="D4D4D4"/>
+                </a:solidFill>
+                <a:latin typeface="Consolas" panose="020B0609020204030204" pitchFamily="49" charset="0"/>
+              </a:rPr>
+              <a:t> </a:t>
+            </a:r>
+            <a:r>
+              <a:rPr lang="en-US" sz="2000" dirty="0">
+                <a:solidFill>
+                  <a:srgbClr val="569CD6"/>
+                </a:solidFill>
+                <a:latin typeface="Consolas" panose="020B0609020204030204" pitchFamily="49" charset="0"/>
+              </a:rPr>
+              <a:t>=&gt;</a:t>
+            </a:r>
+            <a:r>
+              <a:rPr lang="en-US" sz="2000" dirty="0">
+                <a:solidFill>
+                  <a:srgbClr val="D4D4D4"/>
+                </a:solidFill>
+                <a:latin typeface="Consolas" panose="020B0609020204030204" pitchFamily="49" charset="0"/>
+              </a:rPr>
+              <a:t> </a:t>
+            </a:r>
+            <a:r>
+              <a:rPr lang="en-US" sz="2000" dirty="0" err="1">
+                <a:solidFill>
+                  <a:srgbClr val="9CDCFE"/>
+                </a:solidFill>
+                <a:latin typeface="Consolas" panose="020B0609020204030204" pitchFamily="49" charset="0"/>
+              </a:rPr>
+              <a:t>word</a:t>
+            </a:r>
+            <a:r>
+              <a:rPr lang="en-US" sz="2000" dirty="0" err="1">
+                <a:solidFill>
+                  <a:srgbClr val="D4D4D4"/>
+                </a:solidFill>
+                <a:latin typeface="Consolas" panose="020B0609020204030204" pitchFamily="49" charset="0"/>
+              </a:rPr>
+              <a:t>.</a:t>
+            </a:r>
+            <a:r>
+              <a:rPr lang="en-US" sz="2000" dirty="0" err="1">
+                <a:solidFill>
+                  <a:srgbClr val="9CDCFE"/>
+                </a:solidFill>
+                <a:latin typeface="Consolas" panose="020B0609020204030204" pitchFamily="49" charset="0"/>
+              </a:rPr>
+              <a:t>length</a:t>
+            </a:r>
+            <a:r>
+              <a:rPr lang="en-US" sz="2000" dirty="0">
+                <a:solidFill>
+                  <a:srgbClr val="D4D4D4"/>
+                </a:solidFill>
+                <a:latin typeface="Consolas" panose="020B0609020204030204" pitchFamily="49" charset="0"/>
+              </a:rPr>
+              <a:t> &gt; </a:t>
+            </a:r>
+            <a:r>
+              <a:rPr lang="en-US" sz="2000" dirty="0">
+                <a:solidFill>
+                  <a:srgbClr val="B5CEA8"/>
+                </a:solidFill>
+                <a:latin typeface="Consolas" panose="020B0609020204030204" pitchFamily="49" charset="0"/>
+              </a:rPr>
+              <a:t>6</a:t>
+            </a:r>
+            <a:r>
+              <a:rPr lang="en-US" sz="2000" dirty="0">
+                <a:solidFill>
+                  <a:srgbClr val="D4D4D4"/>
+                </a:solidFill>
+                <a:latin typeface="Consolas" panose="020B0609020204030204" pitchFamily="49" charset="0"/>
+              </a:rPr>
+              <a:t>);</a:t>
+            </a:r>
+          </a:p>
+          <a:p>
+            <a:br>
+              <a:rPr lang="en-US" sz="2000" dirty="0">
+                <a:solidFill>
+                  <a:srgbClr val="D4D4D4"/>
+                </a:solidFill>
+                <a:latin typeface="Consolas" panose="020B0609020204030204" pitchFamily="49" charset="0"/>
+              </a:rPr>
+            </a:br>
+            <a:r>
+              <a:rPr lang="en-US" sz="2000" dirty="0">
+                <a:solidFill>
+                  <a:srgbClr val="4EC9B0"/>
+                </a:solidFill>
+                <a:latin typeface="Consolas" panose="020B0609020204030204" pitchFamily="49" charset="0"/>
+              </a:rPr>
+              <a:t>console</a:t>
+            </a:r>
+            <a:r>
+              <a:rPr lang="en-US" sz="2000" dirty="0">
+                <a:solidFill>
+                  <a:srgbClr val="D4D4D4"/>
+                </a:solidFill>
+                <a:latin typeface="Consolas" panose="020B0609020204030204" pitchFamily="49" charset="0"/>
+              </a:rPr>
+              <a:t>.</a:t>
+            </a:r>
+            <a:r>
+              <a:rPr lang="en-US" sz="2000" dirty="0">
+                <a:solidFill>
+                  <a:srgbClr val="DCDCAA"/>
+                </a:solidFill>
+                <a:latin typeface="Consolas" panose="020B0609020204030204" pitchFamily="49" charset="0"/>
+              </a:rPr>
+              <a:t>log</a:t>
+            </a:r>
+            <a:r>
+              <a:rPr lang="en-US" sz="2000" dirty="0">
+                <a:solidFill>
+                  <a:srgbClr val="D4D4D4"/>
+                </a:solidFill>
+                <a:latin typeface="Consolas" panose="020B0609020204030204" pitchFamily="49" charset="0"/>
+              </a:rPr>
+              <a:t>(</a:t>
+            </a:r>
+            <a:r>
+              <a:rPr lang="en-US" sz="2000" dirty="0">
+                <a:solidFill>
+                  <a:srgbClr val="9CDCFE"/>
+                </a:solidFill>
+                <a:latin typeface="Consolas" panose="020B0609020204030204" pitchFamily="49" charset="0"/>
+              </a:rPr>
+              <a:t>result</a:t>
+            </a:r>
+            <a:r>
+              <a:rPr lang="en-US" sz="2000" dirty="0">
+                <a:solidFill>
+                  <a:srgbClr val="D4D4D4"/>
+                </a:solidFill>
+                <a:latin typeface="Consolas" panose="020B0609020204030204" pitchFamily="49" charset="0"/>
+              </a:rPr>
+              <a:t>);</a:t>
+            </a:r>
+          </a:p>
+        </p:txBody>
+      </p:sp>
+    </p:spTree>
+    <p:extLst>
+      <p:ext uri="{BB962C8B-B14F-4D97-AF65-F5344CB8AC3E}">
+        <p14:creationId xmlns:p14="http://schemas.microsoft.com/office/powerpoint/2010/main" val="2798948448"/>
+      </p:ext>
+    </p:extLst>
+  </p:cSld>
+  <p:clrMapOvr>
+    <a:masterClrMapping/>
+  </p:clrMapOvr>
+</p:sld>
+</file>
+
+<file path=ppt/slides/slide21.xml><?xml version="1.0" encoding="utf-8"?>
+<p:sld xmlns:a="http://schemas.openxmlformats.org/drawingml/2006/main" xmlns:r="http://schemas.openxmlformats.org/officeDocument/2006/relationships" xmlns:p="http://schemas.openxmlformats.org/presentationml/2006/main">
+  <p:cSld>
+    <p:spTree>
+      <p:nvGrpSpPr>
+        <p:cNvPr id="1" name=""/>
+        <p:cNvGrpSpPr/>
+        <p:nvPr/>
+      </p:nvGrpSpPr>
+      <p:grpSpPr>
+        <a:xfrm>
+          <a:off x="0" y="0"/>
+          <a:ext cx="0" cy="0"/>
+          <a:chOff x="0" y="0"/>
+          <a:chExt cx="0" cy="0"/>
+        </a:xfrm>
+      </p:grpSpPr>
+      <p:sp>
+        <p:nvSpPr>
           <p:cNvPr id="9" name="Content Placeholder 8">
             <a:extLst>
               <a:ext uri="{FF2B5EF4-FFF2-40B4-BE49-F238E27FC236}">
@@ -27612,7 +28834,7 @@
 </p:sld>
 </file>
 
-<file path=ppt/slides/slide2.xml><?xml version="1.0" encoding="utf-8"?>
+<file path=ppt/slides/slide22.xml><?xml version="1.0" encoding="utf-8"?>
 <p:sld xmlns:a="http://schemas.openxmlformats.org/drawingml/2006/main" xmlns:r="http://schemas.openxmlformats.org/officeDocument/2006/relationships" xmlns:p="http://schemas.openxmlformats.org/presentationml/2006/main">
   <p:cSld>
     <p:spTree>
@@ -27631,179 +28853,6 @@
       </p:grpSpPr>
       <p:sp>
         <p:nvSpPr>
-          <p:cNvPr id="7" name="Title 6">
-            <a:extLst>
-              <a:ext uri="{FF2B5EF4-FFF2-40B4-BE49-F238E27FC236}">
-                <a16:creationId xmlns:a16="http://schemas.microsoft.com/office/drawing/2014/main" id="{C778A389-7C32-4030-AF2B-95D055A208C2}"/>
-              </a:ext>
-            </a:extLst>
-          </p:cNvPr>
-          <p:cNvSpPr>
-            <a:spLocks noGrp="1"/>
-          </p:cNvSpPr>
-          <p:nvPr>
-            <p:ph type="title"/>
-          </p:nvPr>
-        </p:nvSpPr>
-        <p:spPr/>
-        <p:txBody>
-          <a:bodyPr/>
-          <a:lstStyle/>
-          <a:p>
-            <a:r>
-              <a:rPr lang="sr-Latn-RS" dirty="0"/>
-              <a:t>React Workshop</a:t>
-            </a:r>
-            <a:endParaRPr lang="LID4096" dirty="0"/>
-          </a:p>
-        </p:txBody>
-      </p:sp>
-      <p:sp>
-        <p:nvSpPr>
-          <p:cNvPr id="8" name="Text Placeholder 7">
-            <a:extLst>
-              <a:ext uri="{FF2B5EF4-FFF2-40B4-BE49-F238E27FC236}">
-                <a16:creationId xmlns:a16="http://schemas.microsoft.com/office/drawing/2014/main" id="{8128D10F-CCF5-40E5-86E1-237E38584E93}"/>
-              </a:ext>
-            </a:extLst>
-          </p:cNvPr>
-          <p:cNvSpPr>
-            <a:spLocks noGrp="1"/>
-          </p:cNvSpPr>
-          <p:nvPr>
-            <p:ph type="body" sz="quarter" idx="13"/>
-          </p:nvPr>
-        </p:nvSpPr>
-        <p:spPr/>
-        <p:txBody>
-          <a:bodyPr/>
-          <a:lstStyle/>
-          <a:p>
-            <a:r>
-              <a:rPr lang="sr-Latn-RS" dirty="0"/>
-              <a:t>What is the plan?</a:t>
-            </a:r>
-          </a:p>
-        </p:txBody>
-      </p:sp>
-      <p:sp>
-        <p:nvSpPr>
-          <p:cNvPr id="12" name="TextBox 11">
-            <a:extLst>
-              <a:ext uri="{FF2B5EF4-FFF2-40B4-BE49-F238E27FC236}">
-                <a16:creationId xmlns:a16="http://schemas.microsoft.com/office/drawing/2014/main" id="{A11EC94D-1A03-4E9A-803E-E4DB376BDA62}"/>
-              </a:ext>
-            </a:extLst>
-          </p:cNvPr>
-          <p:cNvSpPr txBox="1"/>
-          <p:nvPr/>
-        </p:nvSpPr>
-        <p:spPr>
-          <a:xfrm>
-            <a:off x="406400" y="1988840"/>
-            <a:ext cx="9721080" cy="3742360"/>
-          </a:xfrm>
-          <a:prstGeom prst="rect">
-            <a:avLst/>
-          </a:prstGeom>
-          <a:noFill/>
-        </p:spPr>
-        <p:txBody>
-          <a:bodyPr wrap="none" lIns="0" tIns="0" rIns="0" bIns="0" rtlCol="0">
-            <a:noAutofit/>
-          </a:bodyPr>
-          <a:lstStyle/>
-          <a:p>
-            <a:pPr algn="l"/>
-            <a:r>
-              <a:rPr lang="sr-Latn-RS" sz="2200" dirty="0">
-                <a:latin typeface="AA Zuehlke" pitchFamily="2" charset="0"/>
-              </a:rPr>
-              <a:t>Workshop is organized in two parts.</a:t>
-            </a:r>
-          </a:p>
-          <a:p>
-            <a:pPr algn="l"/>
-            <a:r>
-              <a:rPr lang="sr-Latn-RS" sz="2200" dirty="0">
-                <a:latin typeface="AA Zuehlke" pitchFamily="2" charset="0"/>
-              </a:rPr>
-              <a:t>1st Part – Milan Tončić</a:t>
-            </a:r>
-          </a:p>
-          <a:p>
-            <a:pPr algn="l"/>
-            <a:r>
-              <a:rPr lang="sr-Latn-RS" sz="2200" dirty="0">
-                <a:latin typeface="AA Zuehlke" pitchFamily="2" charset="0"/>
-              </a:rPr>
-              <a:t>2nd Part – Milenko Laptošević</a:t>
-            </a:r>
-          </a:p>
-          <a:p>
-            <a:pPr algn="l"/>
-            <a:endParaRPr lang="sr-Latn-RS" sz="2200" dirty="0">
-              <a:latin typeface="AA Zuehlke" pitchFamily="2" charset="0"/>
-            </a:endParaRPr>
-          </a:p>
-          <a:p>
-            <a:pPr marL="342900" indent="-342900" algn="l">
-              <a:buFontTx/>
-              <a:buChar char="-"/>
-            </a:pPr>
-            <a:r>
-              <a:rPr lang="sr-Latn-RS" sz="2200" dirty="0">
-                <a:latin typeface="AA Zuehlke" pitchFamily="2" charset="0"/>
-              </a:rPr>
-              <a:t>Focus is rather on concepts around React not on the css, javascript </a:t>
-            </a:r>
-          </a:p>
-          <a:p>
-            <a:pPr marL="342900" indent="-342900" algn="l">
-              <a:buFontTx/>
-              <a:buChar char="-"/>
-            </a:pPr>
-            <a:r>
-              <a:rPr lang="sr-Latn-RS" sz="2200" dirty="0">
-                <a:latin typeface="AA Zuehlke" pitchFamily="2" charset="0"/>
-              </a:rPr>
-              <a:t>Learning by doing</a:t>
-            </a:r>
-          </a:p>
-        </p:txBody>
-      </p:sp>
-    </p:spTree>
-    <p:extLst>
-      <p:ext uri="{BB962C8B-B14F-4D97-AF65-F5344CB8AC3E}">
-        <p14:creationId xmlns:p14="http://schemas.microsoft.com/office/powerpoint/2010/main" val="2782898408"/>
-      </p:ext>
-    </p:extLst>
-  </p:cSld>
-  <p:clrMapOvr>
-    <a:masterClrMapping/>
-  </p:clrMapOvr>
-</p:sld>
-</file>
-
-<file path=ppt/slides/slide20.xml><?xml version="1.0" encoding="utf-8"?>
-<p:sld xmlns:a="http://schemas.openxmlformats.org/drawingml/2006/main" xmlns:r="http://schemas.openxmlformats.org/officeDocument/2006/relationships" xmlns:p="http://schemas.openxmlformats.org/presentationml/2006/main">
-  <p:cSld>
-    <p:spTree>
-      <p:nvGrpSpPr>
-        <p:cNvPr id="1" name=""/>
-        <p:cNvGrpSpPr/>
-        <p:nvPr/>
-      </p:nvGrpSpPr>
-      <p:grpSpPr>
-        <a:xfrm>
-          <a:off x="0" y="0"/>
-          <a:ext cx="0" cy="0"/>
-          <a:chOff x="0" y="0"/>
-          <a:chExt cx="0" cy="0"/>
-        </a:xfrm>
-      </p:grpSpPr>
-      <p:sp>
-        <p:nvSpPr>
           <p:cNvPr id="2" name="Text Placeholder 1">
             <a:extLst>
               <a:ext uri="{FF2B5EF4-FFF2-40B4-BE49-F238E27FC236}">
@@ -29028,7 +30077,7 @@
 </p:sld>
 </file>
 
-<file path=ppt/slides/slide21.xml><?xml version="1.0" encoding="utf-8"?>
+<file path=ppt/slides/slide23.xml><?xml version="1.0" encoding="utf-8"?>
 <p:sld xmlns:a="http://schemas.openxmlformats.org/drawingml/2006/main" xmlns:r="http://schemas.openxmlformats.org/officeDocument/2006/relationships" xmlns:p="http://schemas.openxmlformats.org/presentationml/2006/main">
   <p:cSld>
     <p:spTree>
@@ -29371,7 +30420,7 @@
 </p:sld>
 </file>
 
-<file path=ppt/slides/slide22.xml><?xml version="1.0" encoding="utf-8"?>
+<file path=ppt/slides/slide24.xml><?xml version="1.0" encoding="utf-8"?>
 <p:sld xmlns:a="http://schemas.openxmlformats.org/drawingml/2006/main" xmlns:r="http://schemas.openxmlformats.org/officeDocument/2006/relationships" xmlns:p="http://schemas.openxmlformats.org/presentationml/2006/main">
   <p:cSld>
     <p:spTree>
@@ -30593,7 +31642,7 @@
 </p:sld>
 </file>
 
-<file path=ppt/slides/slide23.xml><?xml version="1.0" encoding="utf-8"?>
+<file path=ppt/slides/slide25.xml><?xml version="1.0" encoding="utf-8"?>
 <p:sld xmlns:a="http://schemas.openxmlformats.org/drawingml/2006/main" xmlns:r="http://schemas.openxmlformats.org/officeDocument/2006/relationships" xmlns:p="http://schemas.openxmlformats.org/presentationml/2006/main">
   <p:cSld>
     <p:spTree>
@@ -30816,7 +31865,7 @@
 </p:sld>
 </file>
 
-<file path=ppt/slides/slide24.xml><?xml version="1.0" encoding="utf-8"?>
+<file path=ppt/slides/slide26.xml><?xml version="1.0" encoding="utf-8"?>
 <p:sld xmlns:a="http://schemas.openxmlformats.org/drawingml/2006/main" xmlns:r="http://schemas.openxmlformats.org/officeDocument/2006/relationships" xmlns:p="http://schemas.openxmlformats.org/presentationml/2006/main">
   <p:cSld>
     <p:spTree>
@@ -31165,7 +32214,7 @@
 </p:sld>
 </file>
 
-<file path=ppt/slides/slide25.xml><?xml version="1.0" encoding="utf-8"?>
+<file path=ppt/slides/slide27.xml><?xml version="1.0" encoding="utf-8"?>
 <p:sld xmlns:a="http://schemas.openxmlformats.org/drawingml/2006/main" xmlns:r="http://schemas.openxmlformats.org/officeDocument/2006/relationships" xmlns:p="http://schemas.openxmlformats.org/presentationml/2006/main">
   <p:cSld>
     <p:spTree>
@@ -31376,7 +32425,7 @@
 </p:sld>
 </file>
 
-<file path=ppt/slides/slide26.xml><?xml version="1.0" encoding="utf-8"?>
+<file path=ppt/slides/slide28.xml><?xml version="1.0" encoding="utf-8"?>
 <p:sld xmlns:a="http://schemas.openxmlformats.org/drawingml/2006/main" xmlns:r="http://schemas.openxmlformats.org/officeDocument/2006/relationships" xmlns:p="http://schemas.openxmlformats.org/presentationml/2006/main">
   <p:cSld>
     <p:spTree>
@@ -35073,7 +36122,7 @@
 </file>
 
 <file path=customXml/item1.xml><?xml version="1.0" encoding="utf-8"?>
-<TemplafySlideTemplateConfiguration><![CDATA[{"elementsMetadata":[],"documentContentValidatorConfiguration":{"enableDocumentContentValidator":false,"documentContentValidatorVersion":0},"slideId":"636746835489847965","enableDocumentContentUpdater":true,"version":"1.0"}]]></TemplafySlideTemplateConfiguration>
+<TemplafySlideTemplateConfiguration><![CDATA[{"elementsMetadata":[],"documentContentValidatorConfiguration":{"enableDocumentContentValidator":false,"documentContentValidatorVersion":0},"slideId":"636746835490004289","enableDocumentContentUpdater":true,"version":"1.0"}]]></TemplafySlideTemplateConfiguration>
 </file>
 
 <file path=customXml/item10.xml><?xml version="1.0" encoding="utf-8"?>
@@ -35081,23 +36130,23 @@
 </file>
 
 <file path=customXml/item11.xml><?xml version="1.0" encoding="utf-8"?>
-<TemplafySlideTemplateConfiguration><![CDATA[{"elementsMetadata":[],"documentContentValidatorConfiguration":{"enableDocumentContentValidator":false,"documentContentValidatorVersion":0},"slideId":"636746835490004289","enableDocumentContentUpdater":true,"version":"1.0"}]]></TemplafySlideTemplateConfiguration>
+<TemplafySlideFormConfiguration><![CDATA[{"formFields":[],"formDataEntries":[]}]]></TemplafySlideFormConfiguration>
 </file>
 
 <file path=customXml/item12.xml><?xml version="1.0" encoding="utf-8"?>
-<TemplafySlideTemplateConfiguration><![CDATA[{"elementsMetadata":[],"documentContentValidatorConfiguration":{"enableDocumentContentValidator":false,"documentContentValidatorVersion":0},"slideId":"636746835489847965","enableDocumentContentUpdater":true,"version":"1.0"}]]></TemplafySlideTemplateConfiguration>
+<TemplafySlideFormConfiguration><![CDATA[{"formFields":[],"formDataEntries":[]}]]></TemplafySlideFormConfiguration>
 </file>
 
 <file path=customXml/item13.xml><?xml version="1.0" encoding="utf-8"?>
-<TemplafySlideTemplateConfiguration><![CDATA[{"elementsMetadata":[],"documentContentValidatorConfiguration":{"enableDocumentContentValidator":false,"documentContentValidatorVersion":0},"slideId":"636746835489847964","enableDocumentContentUpdater":true,"version":"1.0"}]]></TemplafySlideTemplateConfiguration>
+<TemplafySlideFormConfiguration><![CDATA[{"formFields":[],"formDataEntries":[]}]]></TemplafySlideFormConfiguration>
 </file>
 
 <file path=customXml/item14.xml><?xml version="1.0" encoding="utf-8"?>
-<TemplafySlideTemplateConfiguration><![CDATA[{"elementsMetadata":[],"documentContentValidatorConfiguration":{"enableDocumentContentValidator":false,"documentContentValidatorVersion":0},"slideId":"636746835489847965","enableDocumentContentUpdater":true,"version":"1.0"}]]></TemplafySlideTemplateConfiguration>
+<TemplafySlideFormConfiguration><![CDATA[{"formFields":[],"formDataEntries":[]}]]></TemplafySlideFormConfiguration>
 </file>
 
 <file path=customXml/item15.xml><?xml version="1.0" encoding="utf-8"?>
-<TemplafySlideFormConfiguration><![CDATA[{"formFields":[],"formDataEntries":[]}]]></TemplafySlideFormConfiguration>
+<TemplafySlideTemplateConfiguration><![CDATA[{"elementsMetadata":[],"documentContentValidatorConfiguration":{"enableDocumentContentValidator":false,"documentContentValidatorVersion":0},"slideId":"636746835490004289","enableDocumentContentUpdater":true,"version":"1.0"}]]></TemplafySlideTemplateConfiguration>
 </file>
 
 <file path=customXml/item16.xml><?xml version="1.0" encoding="utf-8"?>
@@ -35105,11 +36154,11 @@
 </file>
 
 <file path=customXml/item17.xml><?xml version="1.0" encoding="utf-8"?>
-<TemplafySlideFormConfiguration><![CDATA[{"formFields":[],"formDataEntries":[]}]]></TemplafySlideFormConfiguration>
+<TemplafySlideTemplateConfiguration><![CDATA[{"elementsMetadata":[],"documentContentValidatorConfiguration":{"enableDocumentContentValidator":false,"documentContentValidatorVersion":0},"slideId":"636746835489847965","enableDocumentContentUpdater":true,"version":"1.0"}]]></TemplafySlideTemplateConfiguration>
 </file>
 
 <file path=customXml/item18.xml><?xml version="1.0" encoding="utf-8"?>
-<TemplafySlideTemplateConfiguration><![CDATA[{"elementsMetadata":[],"documentContentValidatorConfiguration":{"enableDocumentContentValidator":false,"documentContentValidatorVersion":0},"slideId":"636746835489847965","enableDocumentContentUpdater":true,"version":"1.0"}]]></TemplafySlideTemplateConfiguration>
+<TemplafySlideFormConfiguration><![CDATA[{"formFields":[],"formDataEntries":[]}]]></TemplafySlideFormConfiguration>
 </file>
 
 <file path=customXml/item19.xml><?xml version="1.0" encoding="utf-8"?>
@@ -35121,23 +36170,23 @@
 </file>
 
 <file path=customXml/item20.xml><?xml version="1.0" encoding="utf-8"?>
+<TemplafySlideFormConfiguration><![CDATA[{"formFields":[],"formDataEntries":[]}]]></TemplafySlideFormConfiguration>
+</file>
+
+<file path=customXml/item21.xml><?xml version="1.0" encoding="utf-8"?>
+<TemplafySlideFormConfiguration><![CDATA[{"formFields":[],"formDataEntries":[]}]]></TemplafySlideFormConfiguration>
+</file>
+
+<file path=customXml/item22.xml><?xml version="1.0" encoding="utf-8"?>
+<TemplafyTemplateConfiguration><![CDATA[{"elementsMetadata":[{"type":"shape","id":"08f68ce2-2a58-45a4-901d-4e89f56f11ac","elementConfiguration":{"binding":"UserProfile.Name","disableUpdates":false,"type":"text"}},{"type":"shape","id":"1df6f1da-d768-4f49-9e67-f1e9c0a1c466","elementConfiguration":{"binding":"Form.PresentationTitle","disableUpdates":false,"type":"text"}},{"type":"shape","id":"45caa363-88b4-48fe-b259-e409966cf285","elementConfiguration":{"binding":"Form.Date","disableUpdates":false,"type":"date"}},{"type":"shape","id":"16096920-3388-4030-b675-a9560518daef","elementConfiguration":{"binding":"Form.Privacy_Information.PrivacyInformation","disableUpdates":false,"type":"text"}},{"type":"shape","id":"37615cbb-9475-4d46-a443-9fa91e7f288e","elementConfiguration":{"binding":"UserProfile.OFFICE.Company-spelling","disableUpdates":false,"type":"text"}},{"type":"shape","id":"b5c59f22-25c9-40e3-b13d-2dff97929ca7","elementConfiguration":{"binding":"Form.Date","format":"{{DateFormats.CustomD}}","disableUpdates":false,"type":"date"}}],"transformationConfigurations":[],"templateName":"Empty Zuehlke Template - EN","templateDescription":"Empty presentation 16:9 format EN-UK ","enableDocumentContentUpdater":true,"version":"1.0"}]]></TemplafyTemplateConfiguration>
+</file>
+
+<file path=customXml/item23.xml><?xml version="1.0" encoding="utf-8"?>
 <TemplafySlideTemplateConfiguration><![CDATA[{"elementsMetadata":[],"documentContentValidatorConfiguration":{"enableDocumentContentValidator":false,"documentContentValidatorVersion":0},"slideId":"636746835489847965","enableDocumentContentUpdater":true,"version":"1.0"}]]></TemplafySlideTemplateConfiguration>
 </file>
 
-<file path=customXml/item21.xml><?xml version="1.0" encoding="utf-8"?>
-<TemplafySlideTemplateConfiguration><![CDATA[{"elementsMetadata":[],"documentContentValidatorConfiguration":{"enableDocumentContentValidator":false,"documentContentValidatorVersion":0},"slideId":"636746835490004289","enableDocumentContentUpdater":true,"version":"1.0"}]]></TemplafySlideTemplateConfiguration>
-</file>
-
-<file path=customXml/item22.xml><?xml version="1.0" encoding="utf-8"?>
+<file path=customXml/item24.xml><?xml version="1.0" encoding="utf-8"?>
 <TemplafySlideFormConfiguration><![CDATA[{"formFields":[],"formDataEntries":[]}]]></TemplafySlideFormConfiguration>
-</file>
-
-<file path=customXml/item23.xml><?xml version="1.0" encoding="utf-8"?>
-<TemplafySlideFormConfiguration><![CDATA[{"formFields":[],"formDataEntries":[]}]]></TemplafySlideFormConfiguration>
-</file>
-
-<file path=customXml/item24.xml><?xml version="1.0" encoding="utf-8"?>
-<TemplafySlideTemplateConfiguration><![CDATA[{"elementsMetadata":[],"documentContentValidatorConfiguration":{"enableDocumentContentValidator":false,"documentContentValidatorVersion":0},"slideId":"636746835490004289","enableDocumentContentUpdater":true,"version":"1.0"}]]></TemplafySlideTemplateConfiguration>
 </file>
 
 <file path=customXml/item25.xml><?xml version="1.0" encoding="utf-8"?>
@@ -35145,27 +36194,27 @@
 </file>
 
 <file path=customXml/item26.xml><?xml version="1.0" encoding="utf-8"?>
+<TemplafySlideTemplateConfiguration><![CDATA[{"elementsMetadata":[],"documentContentValidatorConfiguration":{"enableDocumentContentValidator":false,"documentContentValidatorVersion":0},"slideId":"636746835489847965","enableDocumentContentUpdater":true,"version":"1.0"}]]></TemplafySlideTemplateConfiguration>
+</file>
+
+<file path=customXml/item27.xml><?xml version="1.0" encoding="utf-8"?>
+<TemplafySlideTemplateConfiguration><![CDATA[{"elementsMetadata":[],"documentContentValidatorConfiguration":{"enableDocumentContentValidator":false,"documentContentValidatorVersion":0},"slideId":"636746835489847964","enableDocumentContentUpdater":true,"version":"1.0"}]]></TemplafySlideTemplateConfiguration>
+</file>
+
+<file path=customXml/item28.xml><?xml version="1.0" encoding="utf-8"?>
+<TemplafySlideTemplateConfiguration><![CDATA[{"elementsMetadata":[],"documentContentValidatorConfiguration":{"enableDocumentContentValidator":false,"documentContentValidatorVersion":0},"slideId":"636746835489847965","enableDocumentContentUpdater":true,"version":"1.0"}]]></TemplafySlideTemplateConfiguration>
+</file>
+
+<file path=customXml/item29.xml><?xml version="1.0" encoding="utf-8"?>
 <TemplafySlideFormConfiguration><![CDATA[{"formFields":[],"formDataEntries":[]}]]></TemplafySlideFormConfiguration>
 </file>
 
-<file path=customXml/item27.xml><?xml version="1.0" encoding="utf-8"?>
+<file path=customXml/item3.xml><?xml version="1.0" encoding="utf-8"?>
 <TemplafySlideFormConfiguration><![CDATA[{"formFields":[],"formDataEntries":[]}]]></TemplafySlideFormConfiguration>
 </file>
 
-<file path=customXml/item28.xml><?xml version="1.0" encoding="utf-8"?>
-<TemplafySlideFormConfiguration><![CDATA[{"formFields":[],"formDataEntries":[]}]]></TemplafySlideFormConfiguration>
-</file>
-
-<file path=customXml/item29.xml><?xml version="1.0" encoding="utf-8"?>
+<file path=customXml/item30.xml><?xml version="1.0" encoding="utf-8"?>
 <TemplafySlideTemplateConfiguration><![CDATA[{"elementsMetadata":[],"documentContentValidatorConfiguration":{"enableDocumentContentValidator":false,"documentContentValidatorVersion":0},"slideId":"636746835490004289","enableDocumentContentUpdater":true,"version":"1.0"}]]></TemplafySlideTemplateConfiguration>
-</file>
-
-<file path=customXml/item3.xml><?xml version="1.0" encoding="utf-8"?>
-<TemplafyTemplateConfiguration><![CDATA[{"elementsMetadata":[{"type":"shape","id":"08f68ce2-2a58-45a4-901d-4e89f56f11ac","elementConfiguration":{"binding":"UserProfile.Name","disableUpdates":false,"type":"text"}},{"type":"shape","id":"1df6f1da-d768-4f49-9e67-f1e9c0a1c466","elementConfiguration":{"binding":"Form.PresentationTitle","disableUpdates":false,"type":"text"}},{"type":"shape","id":"45caa363-88b4-48fe-b259-e409966cf285","elementConfiguration":{"binding":"Form.Date","disableUpdates":false,"type":"date"}},{"type":"shape","id":"16096920-3388-4030-b675-a9560518daef","elementConfiguration":{"binding":"Form.Privacy_Information.PrivacyInformation","disableUpdates":false,"type":"text"}},{"type":"shape","id":"37615cbb-9475-4d46-a443-9fa91e7f288e","elementConfiguration":{"binding":"UserProfile.OFFICE.Company-spelling","disableUpdates":false,"type":"text"}},{"type":"shape","id":"b5c59f22-25c9-40e3-b13d-2dff97929ca7","elementConfiguration":{"binding":"Form.Date","format":"{{DateFormats.CustomD}}","disableUpdates":false,"type":"date"}}],"transformationConfigurations":[],"templateName":"Empty Zuehlke Template - EN","templateDescription":"Empty presentation 16:9 format EN-UK ","enableDocumentContentUpdater":true,"version":"1.0"}]]></TemplafyTemplateConfiguration>
-</file>
-
-<file path=customXml/item30.xml><?xml version="1.0" encoding="utf-8"?>
-<TemplafySlideFormConfiguration><![CDATA[{"formFields":[],"formDataEntries":[]}]]></TemplafySlideFormConfiguration>
 </file>
 
 <file path=customXml/item4.xml><?xml version="1.0" encoding="utf-8"?>
@@ -35173,7 +36222,7 @@
 </file>
 
 <file path=customXml/item5.xml><?xml version="1.0" encoding="utf-8"?>
-<TemplafySlideTemplateConfiguration><![CDATA[{"elementsMetadata":[],"documentContentValidatorConfiguration":{"enableDocumentContentValidator":false,"documentContentValidatorVersion":0},"slideId":"636746835490004268","enableDocumentContentUpdater":true,"version":"1.0"}]]></TemplafySlideTemplateConfiguration>
+<TemplafySlideTemplateConfiguration><![CDATA[{"elementsMetadata":[],"documentContentValidatorConfiguration":{"enableDocumentContentValidator":false,"documentContentValidatorVersion":0},"slideId":"636746835489847965","enableDocumentContentUpdater":true,"version":"1.0"}]]></TemplafySlideTemplateConfiguration>
 </file>
 
 <file path=customXml/item6.xml><?xml version="1.0" encoding="utf-8"?>
@@ -35185,75 +36234,75 @@
 </file>
 
 <file path=customXml/item8.xml><?xml version="1.0" encoding="utf-8"?>
-<TemplafySlideFormConfiguration><![CDATA[{"formFields":[],"formDataEntries":[]}]]></TemplafySlideFormConfiguration>
+<TemplafySlideTemplateConfiguration><![CDATA[{"elementsMetadata":[],"documentContentValidatorConfiguration":{"enableDocumentContentValidator":false,"documentContentValidatorVersion":0},"slideId":"636746835490004289","enableDocumentContentUpdater":true,"version":"1.0"}]]></TemplafySlideTemplateConfiguration>
 </file>
 
 <file path=customXml/item9.xml><?xml version="1.0" encoding="utf-8"?>
-<TemplafySlideFormConfiguration><![CDATA[{"formFields":[],"formDataEntries":[]}]]></TemplafySlideFormConfiguration>
+<TemplafySlideTemplateConfiguration><![CDATA[{"elementsMetadata":[],"documentContentValidatorConfiguration":{"enableDocumentContentValidator":false,"documentContentValidatorVersion":0},"slideId":"636746835490004268","enableDocumentContentUpdater":true,"version":"1.0"}]]></TemplafySlideTemplateConfiguration>
 </file>
 
 <file path=customXml/itemProps1.xml><?xml version="1.0" encoding="utf-8"?>
-<ds:datastoreItem xmlns:ds="http://schemas.openxmlformats.org/officeDocument/2006/customXml" ds:itemID="{368164A7-F89C-43F0-8856-0052CD65B349}">
+<ds:datastoreItem xmlns:ds="http://schemas.openxmlformats.org/officeDocument/2006/customXml" ds:itemID="{03873124-0E8B-4C51-8AF6-E58C41E19EE9}">
   <ds:schemaRefs/>
 </ds:datastoreItem>
 </file>
 
 <file path=customXml/itemProps10.xml><?xml version="1.0" encoding="utf-8"?>
+<ds:datastoreItem xmlns:ds="http://schemas.openxmlformats.org/officeDocument/2006/customXml" ds:itemID="{03575653-F8BF-4601-9883-AE65C74334E5}">
+  <ds:schemaRefs/>
+</ds:datastoreItem>
+</file>
+
+<file path=customXml/itemProps11.xml><?xml version="1.0" encoding="utf-8"?>
+<ds:datastoreItem xmlns:ds="http://schemas.openxmlformats.org/officeDocument/2006/customXml" ds:itemID="{EE5CF165-A958-44BF-82D1-B9F7CDA0AEDC}">
+  <ds:schemaRefs/>
+</ds:datastoreItem>
+</file>
+
+<file path=customXml/itemProps12.xml><?xml version="1.0" encoding="utf-8"?>
+<ds:datastoreItem xmlns:ds="http://schemas.openxmlformats.org/officeDocument/2006/customXml" ds:itemID="{8ED32200-9B6A-4CCA-9C7B-729BAC048631}">
+  <ds:schemaRefs/>
+</ds:datastoreItem>
+</file>
+
+<file path=customXml/itemProps13.xml><?xml version="1.0" encoding="utf-8"?>
 <ds:datastoreItem xmlns:ds="http://schemas.openxmlformats.org/officeDocument/2006/customXml" ds:itemID="{6CF9EE92-FA60-4684-A7EE-DD7FFC2D436C}">
   <ds:schemaRefs/>
 </ds:datastoreItem>
 </file>
 
-<file path=customXml/itemProps11.xml><?xml version="1.0" encoding="utf-8"?>
-<ds:datastoreItem xmlns:ds="http://schemas.openxmlformats.org/officeDocument/2006/customXml" ds:itemID="{53259424-8451-42DE-99E9-CD1E6E9D24CC}">
+<file path=customXml/itemProps14.xml><?xml version="1.0" encoding="utf-8"?>
+<ds:datastoreItem xmlns:ds="http://schemas.openxmlformats.org/officeDocument/2006/customXml" ds:itemID="{C3D5A9E1-A7B2-4163-8535-269787D26405}">
   <ds:schemaRefs/>
 </ds:datastoreItem>
 </file>
 
-<file path=customXml/itemProps12.xml><?xml version="1.0" encoding="utf-8"?>
-<ds:datastoreItem xmlns:ds="http://schemas.openxmlformats.org/officeDocument/2006/customXml" ds:itemID="{A6DFFBB1-9947-4431-A130-F4E739181114}">
+<file path=customXml/itemProps15.xml><?xml version="1.0" encoding="utf-8"?>
+<ds:datastoreItem xmlns:ds="http://schemas.openxmlformats.org/officeDocument/2006/customXml" ds:itemID="{E526BCF6-BB24-4BF9-B48B-D0769C3D9145}">
   <ds:schemaRefs/>
 </ds:datastoreItem>
 </file>
 
-<file path=customXml/itemProps13.xml><?xml version="1.0" encoding="utf-8"?>
-<ds:datastoreItem xmlns:ds="http://schemas.openxmlformats.org/officeDocument/2006/customXml" ds:itemID="{CC472C16-D918-4FD1-A8DC-961ED60C4BA4}">
+<file path=customXml/itemProps16.xml><?xml version="1.0" encoding="utf-8"?>
+<ds:datastoreItem xmlns:ds="http://schemas.openxmlformats.org/officeDocument/2006/customXml" ds:itemID="{067CD289-AAE9-47C2-A22E-4A438035E00B}">
   <ds:schemaRefs/>
 </ds:datastoreItem>
 </file>
 
-<file path=customXml/itemProps14.xml><?xml version="1.0" encoding="utf-8"?>
+<file path=customXml/itemProps17.xml><?xml version="1.0" encoding="utf-8"?>
 <ds:datastoreItem xmlns:ds="http://schemas.openxmlformats.org/officeDocument/2006/customXml" ds:itemID="{DE42F7B1-7461-4136-A3E0-42D543BA707F}">
   <ds:schemaRefs/>
 </ds:datastoreItem>
 </file>
 
-<file path=customXml/itemProps15.xml><?xml version="1.0" encoding="utf-8"?>
-<ds:datastoreItem xmlns:ds="http://schemas.openxmlformats.org/officeDocument/2006/customXml" ds:itemID="{03575653-F8BF-4601-9883-AE65C74334E5}">
-  <ds:schemaRefs/>
-</ds:datastoreItem>
-</file>
-
-<file path=customXml/itemProps16.xml><?xml version="1.0" encoding="utf-8"?>
-<ds:datastoreItem xmlns:ds="http://schemas.openxmlformats.org/officeDocument/2006/customXml" ds:itemID="{97212B91-0BC9-4A21-906F-4AD19E499FD0}">
-  <ds:schemaRefs/>
-</ds:datastoreItem>
-</file>
-
-<file path=customXml/itemProps17.xml><?xml version="1.0" encoding="utf-8"?>
-<ds:datastoreItem xmlns:ds="http://schemas.openxmlformats.org/officeDocument/2006/customXml" ds:itemID="{3311BC0B-AB97-4D40-96F9-E805F45E31C3}">
-  <ds:schemaRefs/>
-</ds:datastoreItem>
-</file>
-
 <file path=customXml/itemProps18.xml><?xml version="1.0" encoding="utf-8"?>
-<ds:datastoreItem xmlns:ds="http://schemas.openxmlformats.org/officeDocument/2006/customXml" ds:itemID="{43AD7B82-3F7E-437A-BC68-0160E40206CF}">
+<ds:datastoreItem xmlns:ds="http://schemas.openxmlformats.org/officeDocument/2006/customXml" ds:itemID="{4F9B481B-9B69-4B99-BBED-1DB246CF2A96}">
   <ds:schemaRefs/>
 </ds:datastoreItem>
 </file>
 
 <file path=customXml/itemProps19.xml><?xml version="1.0" encoding="utf-8"?>
-<ds:datastoreItem xmlns:ds="http://schemas.openxmlformats.org/officeDocument/2006/customXml" ds:itemID="{C3D5A9E1-A7B2-4163-8535-269787D26405}">
+<ds:datastoreItem xmlns:ds="http://schemas.openxmlformats.org/officeDocument/2006/customXml" ds:itemID="{B62F57A6-BB1F-4B86-B3F0-D793024FCEEB}">
   <ds:schemaRefs/>
 </ds:datastoreItem>
 </file>
@@ -35265,31 +36314,31 @@
 </file>
 
 <file path=customXml/itemProps20.xml><?xml version="1.0" encoding="utf-8"?>
-<ds:datastoreItem xmlns:ds="http://schemas.openxmlformats.org/officeDocument/2006/customXml" ds:itemID="{9AC68698-459C-4EB1-81CC-250ECFF7AA03}">
+<ds:datastoreItem xmlns:ds="http://schemas.openxmlformats.org/officeDocument/2006/customXml" ds:itemID="{68FCBC2C-DF64-4980-A59F-CCC96BE80AC2}">
   <ds:schemaRefs/>
 </ds:datastoreItem>
 </file>
 
 <file path=customXml/itemProps21.xml><?xml version="1.0" encoding="utf-8"?>
-<ds:datastoreItem xmlns:ds="http://schemas.openxmlformats.org/officeDocument/2006/customXml" ds:itemID="{D3086DD5-F620-4041-B434-91B3D63FDF48}">
+<ds:datastoreItem xmlns:ds="http://schemas.openxmlformats.org/officeDocument/2006/customXml" ds:itemID="{DC58A4AD-E5B9-4028-9DAA-C0EAEE150F6A}">
   <ds:schemaRefs/>
 </ds:datastoreItem>
 </file>
 
 <file path=customXml/itemProps22.xml><?xml version="1.0" encoding="utf-8"?>
-<ds:datastoreItem xmlns:ds="http://schemas.openxmlformats.org/officeDocument/2006/customXml" ds:itemID="{4F9B481B-9B69-4B99-BBED-1DB246CF2A96}">
+<ds:datastoreItem xmlns:ds="http://schemas.openxmlformats.org/officeDocument/2006/customXml" ds:itemID="{25CE08FD-F7B6-4F54-8EBC-75735FE238C3}">
   <ds:schemaRefs/>
 </ds:datastoreItem>
 </file>
 
 <file path=customXml/itemProps23.xml><?xml version="1.0" encoding="utf-8"?>
-<ds:datastoreItem xmlns:ds="http://schemas.openxmlformats.org/officeDocument/2006/customXml" ds:itemID="{EE5CF165-A958-44BF-82D1-B9F7CDA0AEDC}">
+<ds:datastoreItem xmlns:ds="http://schemas.openxmlformats.org/officeDocument/2006/customXml" ds:itemID="{A6DFFBB1-9947-4431-A130-F4E739181114}">
   <ds:schemaRefs/>
 </ds:datastoreItem>
 </file>
 
 <file path=customXml/itemProps24.xml><?xml version="1.0" encoding="utf-8"?>
-<ds:datastoreItem xmlns:ds="http://schemas.openxmlformats.org/officeDocument/2006/customXml" ds:itemID="{90F99A8F-5D05-4081-8E1D-ADF3B7BC896C}">
+<ds:datastoreItem xmlns:ds="http://schemas.openxmlformats.org/officeDocument/2006/customXml" ds:itemID="{3311BC0B-AB97-4D40-96F9-E805F45E31C3}">
   <ds:schemaRefs/>
 </ds:datastoreItem>
 </file>
@@ -35301,49 +36350,49 @@
 </file>
 
 <file path=customXml/itemProps26.xml><?xml version="1.0" encoding="utf-8"?>
+<ds:datastoreItem xmlns:ds="http://schemas.openxmlformats.org/officeDocument/2006/customXml" ds:itemID="{9AC68698-459C-4EB1-81CC-250ECFF7AA03}">
+  <ds:schemaRefs/>
+</ds:datastoreItem>
+</file>
+
+<file path=customXml/itemProps27.xml><?xml version="1.0" encoding="utf-8"?>
+<ds:datastoreItem xmlns:ds="http://schemas.openxmlformats.org/officeDocument/2006/customXml" ds:itemID="{CC472C16-D918-4FD1-A8DC-961ED60C4BA4}">
+  <ds:schemaRefs/>
+</ds:datastoreItem>
+</file>
+
+<file path=customXml/itemProps28.xml><?xml version="1.0" encoding="utf-8"?>
+<ds:datastoreItem xmlns:ds="http://schemas.openxmlformats.org/officeDocument/2006/customXml" ds:itemID="{43AD7B82-3F7E-437A-BC68-0160E40206CF}">
+  <ds:schemaRefs/>
+</ds:datastoreItem>
+</file>
+
+<file path=customXml/itemProps29.xml><?xml version="1.0" encoding="utf-8"?>
 <ds:datastoreItem xmlns:ds="http://schemas.openxmlformats.org/officeDocument/2006/customXml" ds:itemID="{F0D8C401-3F13-44C7-A11D-0E17D7299D70}">
   <ds:schemaRefs/>
 </ds:datastoreItem>
 </file>
 
-<file path=customXml/itemProps27.xml><?xml version="1.0" encoding="utf-8"?>
-<ds:datastoreItem xmlns:ds="http://schemas.openxmlformats.org/officeDocument/2006/customXml" ds:itemID="{B62F57A6-BB1F-4B86-B3F0-D793024FCEEB}">
+<file path=customXml/itemProps3.xml><?xml version="1.0" encoding="utf-8"?>
+<ds:datastoreItem xmlns:ds="http://schemas.openxmlformats.org/officeDocument/2006/customXml" ds:itemID="{97212B91-0BC9-4A21-906F-4AD19E499FD0}">
   <ds:schemaRefs/>
 </ds:datastoreItem>
 </file>
 
-<file path=customXml/itemProps28.xml><?xml version="1.0" encoding="utf-8"?>
-<ds:datastoreItem xmlns:ds="http://schemas.openxmlformats.org/officeDocument/2006/customXml" ds:itemID="{8ED32200-9B6A-4CCA-9C7B-729BAC048631}">
+<file path=customXml/itemProps30.xml><?xml version="1.0" encoding="utf-8"?>
+<ds:datastoreItem xmlns:ds="http://schemas.openxmlformats.org/officeDocument/2006/customXml" ds:itemID="{D3086DD5-F620-4041-B434-91B3D63FDF48}">
   <ds:schemaRefs/>
 </ds:datastoreItem>
 </file>
 
-<file path=customXml/itemProps29.xml><?xml version="1.0" encoding="utf-8"?>
+<file path=customXml/itemProps4.xml><?xml version="1.0" encoding="utf-8"?>
 <ds:datastoreItem xmlns:ds="http://schemas.openxmlformats.org/officeDocument/2006/customXml" ds:itemID="{FB8BC845-B0D7-431C-A306-F7D2ADAF072E}">
   <ds:schemaRefs/>
 </ds:datastoreItem>
 </file>
 
-<file path=customXml/itemProps3.xml><?xml version="1.0" encoding="utf-8"?>
-<ds:datastoreItem xmlns:ds="http://schemas.openxmlformats.org/officeDocument/2006/customXml" ds:itemID="{25CE08FD-F7B6-4F54-8EBC-75735FE238C3}">
-  <ds:schemaRefs/>
-</ds:datastoreItem>
-</file>
-
-<file path=customXml/itemProps30.xml><?xml version="1.0" encoding="utf-8"?>
-<ds:datastoreItem xmlns:ds="http://schemas.openxmlformats.org/officeDocument/2006/customXml" ds:itemID="{68FCBC2C-DF64-4980-A59F-CCC96BE80AC2}">
-  <ds:schemaRefs/>
-</ds:datastoreItem>
-</file>
-
-<file path=customXml/itemProps4.xml><?xml version="1.0" encoding="utf-8"?>
-<ds:datastoreItem xmlns:ds="http://schemas.openxmlformats.org/officeDocument/2006/customXml" ds:itemID="{E526BCF6-BB24-4BF9-B48B-D0769C3D9145}">
-  <ds:schemaRefs/>
-</ds:datastoreItem>
-</file>
-
 <file path=customXml/itemProps5.xml><?xml version="1.0" encoding="utf-8"?>
-<ds:datastoreItem xmlns:ds="http://schemas.openxmlformats.org/officeDocument/2006/customXml" ds:itemID="{4045C7B6-24CF-4215-AE01-E323DB3B7A8A}">
+<ds:datastoreItem xmlns:ds="http://schemas.openxmlformats.org/officeDocument/2006/customXml" ds:itemID="{368164A7-F89C-43F0-8856-0052CD65B349}">
   <ds:schemaRefs/>
 </ds:datastoreItem>
 </file>
@@ -35355,19 +36404,19 @@
 </file>
 
 <file path=customXml/itemProps7.xml><?xml version="1.0" encoding="utf-8"?>
-<ds:datastoreItem xmlns:ds="http://schemas.openxmlformats.org/officeDocument/2006/customXml" ds:itemID="{03873124-0E8B-4C51-8AF6-E58C41E19EE9}">
+<ds:datastoreItem xmlns:ds="http://schemas.openxmlformats.org/officeDocument/2006/customXml" ds:itemID="{53259424-8451-42DE-99E9-CD1E6E9D24CC}">
   <ds:schemaRefs/>
 </ds:datastoreItem>
 </file>
 
 <file path=customXml/itemProps8.xml><?xml version="1.0" encoding="utf-8"?>
-<ds:datastoreItem xmlns:ds="http://schemas.openxmlformats.org/officeDocument/2006/customXml" ds:itemID="{DC58A4AD-E5B9-4028-9DAA-C0EAEE150F6A}">
+<ds:datastoreItem xmlns:ds="http://schemas.openxmlformats.org/officeDocument/2006/customXml" ds:itemID="{90F99A8F-5D05-4081-8E1D-ADF3B7BC896C}">
   <ds:schemaRefs/>
 </ds:datastoreItem>
 </file>
 
 <file path=customXml/itemProps9.xml><?xml version="1.0" encoding="utf-8"?>
-<ds:datastoreItem xmlns:ds="http://schemas.openxmlformats.org/officeDocument/2006/customXml" ds:itemID="{067CD289-AAE9-47C2-A22E-4A438035E00B}">
+<ds:datastoreItem xmlns:ds="http://schemas.openxmlformats.org/officeDocument/2006/customXml" ds:itemID="{4045C7B6-24CF-4215-AE01-E323DB3B7A8A}">
   <ds:schemaRefs/>
 </ds:datastoreItem>
 </file>
</xml_diff>